<commit_message>
Last update with ALL
</commit_message>
<xml_diff>
--- a/step by step compile and obs usage guide.pptx
+++ b/step by step compile and obs usage guide.pptx
@@ -20,6 +20,7 @@
     <p:sldId id="271" r:id="rId14"/>
     <p:sldId id="272" r:id="rId15"/>
     <p:sldId id="258" r:id="rId16"/>
+    <p:sldId id="273" r:id="rId17"/>
   </p:sldIdLst>
   <p:sldSz cx="12192000" cy="6858000"/>
   <p:notesSz cx="6858000" cy="9144000"/>
@@ -118,6 +119,11 @@
       </a:defRPr>
     </a:lvl9pPr>
   </p:defaultTextStyle>
+  <p:extLst>
+    <p:ext uri="{EFAFB233-063F-42B5-8137-9DF3F51BA10A}">
+      <p15:sldGuideLst xmlns:p15="http://schemas.microsoft.com/office/powerpoint/2012/main"/>
+    </p:ext>
+  </p:extLst>
 </p:presentation>
 </file>
 
@@ -270,7 +276,7 @@
           <a:p>
             <a:fld id="{1A418D1B-1596-4091-B6A5-2728C30B680B}" type="datetimeFigureOut">
               <a:rPr lang="es-ES" smtClean="0"/>
-              <a:t>13/06/2021</a:t>
+              <a:t>15/06/2021</a:t>
             </a:fld>
             <a:endParaRPr lang="es-ES"/>
           </a:p>
@@ -470,7 +476,7 @@
           <a:p>
             <a:fld id="{1A418D1B-1596-4091-B6A5-2728C30B680B}" type="datetimeFigureOut">
               <a:rPr lang="es-ES" smtClean="0"/>
-              <a:t>13/06/2021</a:t>
+              <a:t>15/06/2021</a:t>
             </a:fld>
             <a:endParaRPr lang="es-ES"/>
           </a:p>
@@ -680,7 +686,7 @@
           <a:p>
             <a:fld id="{1A418D1B-1596-4091-B6A5-2728C30B680B}" type="datetimeFigureOut">
               <a:rPr lang="es-ES" smtClean="0"/>
-              <a:t>13/06/2021</a:t>
+              <a:t>15/06/2021</a:t>
             </a:fld>
             <a:endParaRPr lang="es-ES"/>
           </a:p>
@@ -880,7 +886,7 @@
           <a:p>
             <a:fld id="{1A418D1B-1596-4091-B6A5-2728C30B680B}" type="datetimeFigureOut">
               <a:rPr lang="es-ES" smtClean="0"/>
-              <a:t>13/06/2021</a:t>
+              <a:t>15/06/2021</a:t>
             </a:fld>
             <a:endParaRPr lang="es-ES"/>
           </a:p>
@@ -1156,7 +1162,7 @@
           <a:p>
             <a:fld id="{1A418D1B-1596-4091-B6A5-2728C30B680B}" type="datetimeFigureOut">
               <a:rPr lang="es-ES" smtClean="0"/>
-              <a:t>13/06/2021</a:t>
+              <a:t>15/06/2021</a:t>
             </a:fld>
             <a:endParaRPr lang="es-ES"/>
           </a:p>
@@ -1424,7 +1430,7 @@
           <a:p>
             <a:fld id="{1A418D1B-1596-4091-B6A5-2728C30B680B}" type="datetimeFigureOut">
               <a:rPr lang="es-ES" smtClean="0"/>
-              <a:t>13/06/2021</a:t>
+              <a:t>15/06/2021</a:t>
             </a:fld>
             <a:endParaRPr lang="es-ES"/>
           </a:p>
@@ -1839,7 +1845,7 @@
           <a:p>
             <a:fld id="{1A418D1B-1596-4091-B6A5-2728C30B680B}" type="datetimeFigureOut">
               <a:rPr lang="es-ES" smtClean="0"/>
-              <a:t>13/06/2021</a:t>
+              <a:t>15/06/2021</a:t>
             </a:fld>
             <a:endParaRPr lang="es-ES"/>
           </a:p>
@@ -1981,7 +1987,7 @@
           <a:p>
             <a:fld id="{1A418D1B-1596-4091-B6A5-2728C30B680B}" type="datetimeFigureOut">
               <a:rPr lang="es-ES" smtClean="0"/>
-              <a:t>13/06/2021</a:t>
+              <a:t>15/06/2021</a:t>
             </a:fld>
             <a:endParaRPr lang="es-ES"/>
           </a:p>
@@ -2094,7 +2100,7 @@
           <a:p>
             <a:fld id="{1A418D1B-1596-4091-B6A5-2728C30B680B}" type="datetimeFigureOut">
               <a:rPr lang="es-ES" smtClean="0"/>
-              <a:t>13/06/2021</a:t>
+              <a:t>15/06/2021</a:t>
             </a:fld>
             <a:endParaRPr lang="es-ES"/>
           </a:p>
@@ -2407,7 +2413,7 @@
           <a:p>
             <a:fld id="{1A418D1B-1596-4091-B6A5-2728C30B680B}" type="datetimeFigureOut">
               <a:rPr lang="es-ES" smtClean="0"/>
-              <a:t>13/06/2021</a:t>
+              <a:t>15/06/2021</a:t>
             </a:fld>
             <a:endParaRPr lang="es-ES"/>
           </a:p>
@@ -2696,7 +2702,7 @@
           <a:p>
             <a:fld id="{1A418D1B-1596-4091-B6A5-2728C30B680B}" type="datetimeFigureOut">
               <a:rPr lang="es-ES" smtClean="0"/>
-              <a:t>13/06/2021</a:t>
+              <a:t>15/06/2021</a:t>
             </a:fld>
             <a:endParaRPr lang="es-ES"/>
           </a:p>
@@ -2939,7 +2945,7 @@
           <a:p>
             <a:fld id="{1A418D1B-1596-4091-B6A5-2728C30B680B}" type="datetimeFigureOut">
               <a:rPr lang="es-ES" smtClean="0"/>
-              <a:t>13/06/2021</a:t>
+              <a:t>15/06/2021</a:t>
             </a:fld>
             <a:endParaRPr lang="es-ES"/>
           </a:p>
@@ -10275,6 +10281,2697 @@
 </p:sld>
 </file>
 
+<file path=ppt/slides/slide16.xml><?xml version="1.0" encoding="utf-8"?>
+<p:sld xmlns:a="http://schemas.openxmlformats.org/drawingml/2006/main" xmlns:r="http://schemas.openxmlformats.org/officeDocument/2006/relationships" xmlns:p="http://schemas.openxmlformats.org/presentationml/2006/main">
+  <p:cSld>
+    <p:bg>
+      <p:bgPr>
+        <a:solidFill>
+          <a:schemeClr val="bg1"/>
+        </a:solidFill>
+        <a:effectLst/>
+      </p:bgPr>
+    </p:bg>
+    <p:spTree>
+      <p:nvGrpSpPr>
+        <p:cNvPr id="1" name=""/>
+        <p:cNvGrpSpPr/>
+        <p:nvPr/>
+      </p:nvGrpSpPr>
+      <p:grpSpPr>
+        <a:xfrm>
+          <a:off x="0" y="0"/>
+          <a:ext cx="0" cy="0"/>
+          <a:chOff x="0" y="0"/>
+          <a:chExt cx="0" cy="0"/>
+        </a:xfrm>
+      </p:grpSpPr>
+      <p:sp>
+        <p:nvSpPr>
+          <p:cNvPr id="8" name="Rectangle 7">
+            <a:extLst>
+              <a:ext uri="{FF2B5EF4-FFF2-40B4-BE49-F238E27FC236}">
+                <a16:creationId xmlns:a16="http://schemas.microsoft.com/office/drawing/2014/main" id="{F3060C83-F051-4F0E-ABAD-AA0DFC48B218}"/>
+              </a:ext>
+              <a:ext uri="{C183D7F6-B498-43B3-948B-1728B52AA6E4}">
+                <adec:decorative xmlns:adec="http://schemas.microsoft.com/office/drawing/2017/decorative" val="1"/>
+              </a:ext>
+            </a:extLst>
+          </p:cNvPr>
+          <p:cNvSpPr>
+            <a:spLocks noGrp="1" noRot="1" noChangeAspect="1" noMove="1" noResize="1" noEditPoints="1" noAdjustHandles="1" noChangeArrowheads="1" noChangeShapeType="1" noTextEdit="1"/>
+          </p:cNvSpPr>
+          <p:nvPr>
+            <p:extLst>
+              <p:ext uri="{386F3935-93C4-4BCD-93E2-E3B085C9AB24}">
+                <p16:designElem xmlns:p16="http://schemas.microsoft.com/office/powerpoint/2015/main" val="1"/>
+              </p:ext>
+            </p:extLst>
+          </p:nvPr>
+        </p:nvSpPr>
+        <p:spPr>
+          <a:xfrm>
+            <a:off x="0" y="0"/>
+            <a:ext cx="12192000" cy="6858000"/>
+          </a:xfrm>
+          <a:prstGeom prst="rect">
+            <a:avLst/>
+          </a:prstGeom>
+          <a:solidFill>
+            <a:schemeClr val="bg1"/>
+          </a:solidFill>
+          <a:ln>
+            <a:noFill/>
+          </a:ln>
+        </p:spPr>
+        <p:style>
+          <a:lnRef idx="2">
+            <a:schemeClr val="accent1">
+              <a:shade val="50000"/>
+            </a:schemeClr>
+          </a:lnRef>
+          <a:fillRef idx="1">
+            <a:schemeClr val="accent1"/>
+          </a:fillRef>
+          <a:effectRef idx="0">
+            <a:schemeClr val="accent1"/>
+          </a:effectRef>
+          <a:fontRef idx="minor">
+            <a:schemeClr val="lt1"/>
+          </a:fontRef>
+        </p:style>
+        <p:txBody>
+          <a:bodyPr rtlCol="0" anchor="ctr"/>
+          <a:lstStyle/>
+          <a:p>
+            <a:pPr algn="ctr"/>
+            <a:endParaRPr lang="en-US" dirty="0"/>
+          </a:p>
+        </p:txBody>
+      </p:sp>
+      <p:sp>
+        <p:nvSpPr>
+          <p:cNvPr id="10" name="Freeform: Shape 9">
+            <a:extLst>
+              <a:ext uri="{FF2B5EF4-FFF2-40B4-BE49-F238E27FC236}">
+                <a16:creationId xmlns:a16="http://schemas.microsoft.com/office/drawing/2014/main" id="{83C98ABE-055B-441F-B07E-44F97F083C39}"/>
+              </a:ext>
+              <a:ext uri="{C183D7F6-B498-43B3-948B-1728B52AA6E4}">
+                <adec:decorative xmlns:adec="http://schemas.microsoft.com/office/drawing/2017/decorative" val="1"/>
+              </a:ext>
+            </a:extLst>
+          </p:cNvPr>
+          <p:cNvSpPr>
+            <a:spLocks noGrp="1" noRot="1" noChangeAspect="1" noMove="1" noResize="1" noEditPoints="1" noAdjustHandles="1" noChangeArrowheads="1" noChangeShapeType="1" noTextEdit="1"/>
+          </p:cNvSpPr>
+          <p:nvPr>
+            <p:extLst>
+              <p:ext uri="{386F3935-93C4-4BCD-93E2-E3B085C9AB24}">
+                <p16:designElem xmlns:p16="http://schemas.microsoft.com/office/powerpoint/2015/main" val="1"/>
+              </p:ext>
+            </p:extLst>
+          </p:nvPr>
+        </p:nvSpPr>
+        <p:spPr>
+          <a:xfrm rot="18900000" flipH="1">
+            <a:off x="-376156" y="-253670"/>
+            <a:ext cx="1827638" cy="1376989"/>
+          </a:xfrm>
+          <a:custGeom>
+            <a:avLst/>
+            <a:gdLst>
+              <a:gd name="connsiteX0" fmla="*/ 0 w 1827638"/>
+              <a:gd name="connsiteY0" fmla="*/ 987379 h 1376989"/>
+              <a:gd name="connsiteX1" fmla="*/ 987379 w 1827638"/>
+              <a:gd name="connsiteY1" fmla="*/ 0 h 1376989"/>
+              <a:gd name="connsiteX2" fmla="*/ 1827638 w 1827638"/>
+              <a:gd name="connsiteY2" fmla="*/ 840260 h 1376989"/>
+              <a:gd name="connsiteX3" fmla="*/ 1827638 w 1827638"/>
+              <a:gd name="connsiteY3" fmla="*/ 1376989 h 1376989"/>
+              <a:gd name="connsiteX4" fmla="*/ 0 w 1827638"/>
+              <a:gd name="connsiteY4" fmla="*/ 1376989 h 1376989"/>
+            </a:gdLst>
+            <a:ahLst/>
+            <a:cxnLst>
+              <a:cxn ang="0">
+                <a:pos x="connsiteX0" y="connsiteY0"/>
+              </a:cxn>
+              <a:cxn ang="0">
+                <a:pos x="connsiteX1" y="connsiteY1"/>
+              </a:cxn>
+              <a:cxn ang="0">
+                <a:pos x="connsiteX2" y="connsiteY2"/>
+              </a:cxn>
+              <a:cxn ang="0">
+                <a:pos x="connsiteX3" y="connsiteY3"/>
+              </a:cxn>
+              <a:cxn ang="0">
+                <a:pos x="connsiteX4" y="connsiteY4"/>
+              </a:cxn>
+            </a:cxnLst>
+            <a:rect l="l" t="t" r="r" b="b"/>
+            <a:pathLst>
+              <a:path w="1827638" h="1376989">
+                <a:moveTo>
+                  <a:pt x="0" y="987379"/>
+                </a:moveTo>
+                <a:lnTo>
+                  <a:pt x="987379" y="0"/>
+                </a:lnTo>
+                <a:lnTo>
+                  <a:pt x="1827638" y="840260"/>
+                </a:lnTo>
+                <a:lnTo>
+                  <a:pt x="1827638" y="1376989"/>
+                </a:lnTo>
+                <a:lnTo>
+                  <a:pt x="0" y="1376989"/>
+                </a:lnTo>
+                <a:close/>
+              </a:path>
+            </a:pathLst>
+          </a:custGeom>
+          <a:solidFill>
+            <a:schemeClr val="accent1">
+              <a:alpha val="30000"/>
+            </a:schemeClr>
+          </a:solidFill>
+          <a:ln>
+            <a:noFill/>
+          </a:ln>
+        </p:spPr>
+        <p:style>
+          <a:lnRef idx="2">
+            <a:schemeClr val="accent1">
+              <a:shade val="50000"/>
+            </a:schemeClr>
+          </a:lnRef>
+          <a:fillRef idx="1">
+            <a:schemeClr val="accent1"/>
+          </a:fillRef>
+          <a:effectRef idx="0">
+            <a:schemeClr val="accent1"/>
+          </a:effectRef>
+          <a:fontRef idx="minor">
+            <a:schemeClr val="lt1"/>
+          </a:fontRef>
+        </p:style>
+        <p:txBody>
+          <a:bodyPr rtlCol="0" anchor="ctr"/>
+          <a:lstStyle/>
+          <a:p>
+            <a:pPr algn="ctr"/>
+            <a:endParaRPr lang="en-US" dirty="0"/>
+          </a:p>
+        </p:txBody>
+      </p:sp>
+      <p:sp>
+        <p:nvSpPr>
+          <p:cNvPr id="12" name="Rectangle 11">
+            <a:extLst>
+              <a:ext uri="{FF2B5EF4-FFF2-40B4-BE49-F238E27FC236}">
+                <a16:creationId xmlns:a16="http://schemas.microsoft.com/office/drawing/2014/main" id="{29FDB030-9B49-4CED-8CCD-4D99382388AC}"/>
+              </a:ext>
+              <a:ext uri="{C183D7F6-B498-43B3-948B-1728B52AA6E4}">
+                <adec:decorative xmlns:adec="http://schemas.microsoft.com/office/drawing/2017/decorative" val="1"/>
+              </a:ext>
+            </a:extLst>
+          </p:cNvPr>
+          <p:cNvSpPr>
+            <a:spLocks noGrp="1" noRot="1" noChangeAspect="1" noMove="1" noResize="1" noEditPoints="1" noAdjustHandles="1" noChangeArrowheads="1" noChangeShapeType="1" noTextEdit="1"/>
+          </p:cNvSpPr>
+          <p:nvPr>
+            <p:extLst>
+              <p:ext uri="{386F3935-93C4-4BCD-93E2-E3B085C9AB24}">
+                <p16:designElem xmlns:p16="http://schemas.microsoft.com/office/powerpoint/2015/main" val="1"/>
+              </p:ext>
+            </p:extLst>
+          </p:nvPr>
+        </p:nvSpPr>
+        <p:spPr>
+          <a:xfrm rot="18900000" flipH="1">
+            <a:off x="891641" y="422146"/>
+            <a:ext cx="645368" cy="645368"/>
+          </a:xfrm>
+          <a:prstGeom prst="rect">
+            <a:avLst/>
+          </a:prstGeom>
+          <a:solidFill>
+            <a:schemeClr val="accent1">
+              <a:alpha val="30000"/>
+            </a:schemeClr>
+          </a:solidFill>
+          <a:ln>
+            <a:noFill/>
+          </a:ln>
+        </p:spPr>
+        <p:style>
+          <a:lnRef idx="2">
+            <a:schemeClr val="accent1">
+              <a:shade val="50000"/>
+            </a:schemeClr>
+          </a:lnRef>
+          <a:fillRef idx="1">
+            <a:schemeClr val="accent1"/>
+          </a:fillRef>
+          <a:effectRef idx="0">
+            <a:schemeClr val="accent1"/>
+          </a:effectRef>
+          <a:fontRef idx="minor">
+            <a:schemeClr val="lt1"/>
+          </a:fontRef>
+        </p:style>
+        <p:txBody>
+          <a:bodyPr rtlCol="0" anchor="ctr"/>
+          <a:lstStyle/>
+          <a:p>
+            <a:pPr algn="ctr"/>
+            <a:endParaRPr lang="en-US"/>
+          </a:p>
+        </p:txBody>
+      </p:sp>
+      <p:sp>
+        <p:nvSpPr>
+          <p:cNvPr id="14" name="Rectangle 13">
+            <a:extLst>
+              <a:ext uri="{FF2B5EF4-FFF2-40B4-BE49-F238E27FC236}">
+                <a16:creationId xmlns:a16="http://schemas.microsoft.com/office/drawing/2014/main" id="{3783CA14-24A1-485C-8B30-D6A5D87987AD}"/>
+              </a:ext>
+              <a:ext uri="{C183D7F6-B498-43B3-948B-1728B52AA6E4}">
+                <adec:decorative xmlns:adec="http://schemas.microsoft.com/office/drawing/2017/decorative" val="1"/>
+              </a:ext>
+            </a:extLst>
+          </p:cNvPr>
+          <p:cNvSpPr>
+            <a:spLocks noGrp="1" noRot="1" noChangeAspect="1" noMove="1" noResize="1" noEditPoints="1" noAdjustHandles="1" noChangeArrowheads="1" noChangeShapeType="1" noTextEdit="1"/>
+          </p:cNvSpPr>
+          <p:nvPr>
+            <p:extLst>
+              <p:ext uri="{386F3935-93C4-4BCD-93E2-E3B085C9AB24}">
+                <p16:designElem xmlns:p16="http://schemas.microsoft.com/office/powerpoint/2015/main" val="1"/>
+              </p:ext>
+            </p:extLst>
+          </p:nvPr>
+        </p:nvSpPr>
+        <p:spPr>
+          <a:xfrm rot="18900000" flipH="1">
+            <a:off x="10043482" y="655140"/>
+            <a:ext cx="687472" cy="687472"/>
+          </a:xfrm>
+          <a:prstGeom prst="rect">
+            <a:avLst/>
+          </a:prstGeom>
+          <a:solidFill>
+            <a:schemeClr val="accent4">
+              <a:alpha val="30000"/>
+            </a:schemeClr>
+          </a:solidFill>
+          <a:ln>
+            <a:noFill/>
+          </a:ln>
+        </p:spPr>
+        <p:style>
+          <a:lnRef idx="2">
+            <a:schemeClr val="accent1">
+              <a:shade val="50000"/>
+            </a:schemeClr>
+          </a:lnRef>
+          <a:fillRef idx="1">
+            <a:schemeClr val="accent1"/>
+          </a:fillRef>
+          <a:effectRef idx="0">
+            <a:schemeClr val="accent1"/>
+          </a:effectRef>
+          <a:fontRef idx="minor">
+            <a:schemeClr val="lt1"/>
+          </a:fontRef>
+        </p:style>
+        <p:txBody>
+          <a:bodyPr rtlCol="0" anchor="ctr"/>
+          <a:lstStyle/>
+          <a:p>
+            <a:pPr algn="ctr"/>
+            <a:endParaRPr lang="en-US"/>
+          </a:p>
+        </p:txBody>
+      </p:sp>
+      <p:sp>
+        <p:nvSpPr>
+          <p:cNvPr id="16" name="Freeform: Shape 15">
+            <a:extLst>
+              <a:ext uri="{FF2B5EF4-FFF2-40B4-BE49-F238E27FC236}">
+                <a16:creationId xmlns:a16="http://schemas.microsoft.com/office/drawing/2014/main" id="{9A97C86A-04D6-40F7-AE84-31AB43E6A846}"/>
+              </a:ext>
+              <a:ext uri="{C183D7F6-B498-43B3-948B-1728B52AA6E4}">
+                <adec:decorative xmlns:adec="http://schemas.microsoft.com/office/drawing/2017/decorative" val="1"/>
+              </a:ext>
+            </a:extLst>
+          </p:cNvPr>
+          <p:cNvSpPr>
+            <a:spLocks noGrp="1" noRot="1" noChangeAspect="1" noMove="1" noResize="1" noEditPoints="1" noAdjustHandles="1" noChangeArrowheads="1" noChangeShapeType="1" noTextEdit="1"/>
+          </p:cNvSpPr>
+          <p:nvPr>
+            <p:extLst>
+              <p:ext uri="{386F3935-93C4-4BCD-93E2-E3B085C9AB24}">
+                <p16:designElem xmlns:p16="http://schemas.microsoft.com/office/powerpoint/2015/main" val="1"/>
+              </p:ext>
+            </p:extLst>
+          </p:nvPr>
+        </p:nvSpPr>
+        <p:spPr>
+          <a:xfrm rot="10800000" flipH="1">
+            <a:off x="9356643" y="0"/>
+            <a:ext cx="2835357" cy="1480837"/>
+          </a:xfrm>
+          <a:custGeom>
+            <a:avLst/>
+            <a:gdLst>
+              <a:gd name="connsiteX0" fmla="*/ 2835357 w 2835357"/>
+              <a:gd name="connsiteY0" fmla="*/ 1480837 h 1480837"/>
+              <a:gd name="connsiteX1" fmla="*/ 0 w 2835357"/>
+              <a:gd name="connsiteY1" fmla="*/ 1480837 h 1480837"/>
+              <a:gd name="connsiteX2" fmla="*/ 1552727 w 2835357"/>
+              <a:gd name="connsiteY2" fmla="*/ 0 h 1480837"/>
+              <a:gd name="connsiteX3" fmla="*/ 2835357 w 2835357"/>
+              <a:gd name="connsiteY3" fmla="*/ 1223245 h 1480837"/>
+            </a:gdLst>
+            <a:ahLst/>
+            <a:cxnLst>
+              <a:cxn ang="0">
+                <a:pos x="connsiteX0" y="connsiteY0"/>
+              </a:cxn>
+              <a:cxn ang="0">
+                <a:pos x="connsiteX1" y="connsiteY1"/>
+              </a:cxn>
+              <a:cxn ang="0">
+                <a:pos x="connsiteX2" y="connsiteY2"/>
+              </a:cxn>
+              <a:cxn ang="0">
+                <a:pos x="connsiteX3" y="connsiteY3"/>
+              </a:cxn>
+            </a:cxnLst>
+            <a:rect l="l" t="t" r="r" b="b"/>
+            <a:pathLst>
+              <a:path w="2835357" h="1480837">
+                <a:moveTo>
+                  <a:pt x="2835357" y="1480837"/>
+                </a:moveTo>
+                <a:lnTo>
+                  <a:pt x="0" y="1480837"/>
+                </a:lnTo>
+                <a:lnTo>
+                  <a:pt x="1552727" y="0"/>
+                </a:lnTo>
+                <a:lnTo>
+                  <a:pt x="2835357" y="1223245"/>
+                </a:lnTo>
+                <a:close/>
+              </a:path>
+            </a:pathLst>
+          </a:custGeom>
+          <a:solidFill>
+            <a:schemeClr val="accent4">
+              <a:alpha val="30000"/>
+            </a:schemeClr>
+          </a:solidFill>
+          <a:ln>
+            <a:noFill/>
+          </a:ln>
+        </p:spPr>
+        <p:style>
+          <a:lnRef idx="2">
+            <a:schemeClr val="accent1">
+              <a:shade val="50000"/>
+            </a:schemeClr>
+          </a:lnRef>
+          <a:fillRef idx="1">
+            <a:schemeClr val="accent1"/>
+          </a:fillRef>
+          <a:effectRef idx="0">
+            <a:schemeClr val="accent1"/>
+          </a:effectRef>
+          <a:fontRef idx="minor">
+            <a:schemeClr val="lt1"/>
+          </a:fontRef>
+        </p:style>
+        <p:txBody>
+          <a:bodyPr wrap="square" rtlCol="0" anchor="ctr">
+            <a:noAutofit/>
+          </a:bodyPr>
+          <a:lstStyle/>
+          <a:p>
+            <a:pPr algn="ctr"/>
+            <a:endParaRPr lang="en-US" dirty="0"/>
+          </a:p>
+        </p:txBody>
+      </p:sp>
+      <p:sp>
+        <p:nvSpPr>
+          <p:cNvPr id="18" name="Isosceles Triangle 17">
+            <a:extLst>
+              <a:ext uri="{FF2B5EF4-FFF2-40B4-BE49-F238E27FC236}">
+                <a16:creationId xmlns:a16="http://schemas.microsoft.com/office/drawing/2014/main" id="{FF9F2414-84E8-453E-B1F3-389FDE8192D9}"/>
+              </a:ext>
+              <a:ext uri="{C183D7F6-B498-43B3-948B-1728B52AA6E4}">
+                <adec:decorative xmlns:adec="http://schemas.microsoft.com/office/drawing/2017/decorative" val="1"/>
+              </a:ext>
+            </a:extLst>
+          </p:cNvPr>
+          <p:cNvSpPr>
+            <a:spLocks noGrp="1" noRot="1" noChangeAspect="1" noMove="1" noResize="1" noEditPoints="1" noAdjustHandles="1" noChangeArrowheads="1" noChangeShapeType="1" noTextEdit="1"/>
+          </p:cNvSpPr>
+          <p:nvPr>
+            <p:extLst>
+              <p:ext uri="{386F3935-93C4-4BCD-93E2-E3B085C9AB24}">
+                <p16:designElem xmlns:p16="http://schemas.microsoft.com/office/powerpoint/2015/main" val="1"/>
+              </p:ext>
+            </p:extLst>
+          </p:nvPr>
+        </p:nvSpPr>
+        <p:spPr>
+          <a:xfrm flipH="1">
+            <a:off x="7976344" y="6115501"/>
+            <a:ext cx="1494513" cy="742499"/>
+          </a:xfrm>
+          <a:prstGeom prst="triangle">
+            <a:avLst/>
+          </a:prstGeom>
+          <a:solidFill>
+            <a:schemeClr val="accent1">
+              <a:alpha val="30000"/>
+            </a:schemeClr>
+          </a:solidFill>
+          <a:ln>
+            <a:noFill/>
+          </a:ln>
+        </p:spPr>
+        <p:style>
+          <a:lnRef idx="2">
+            <a:schemeClr val="accent1">
+              <a:shade val="50000"/>
+            </a:schemeClr>
+          </a:lnRef>
+          <a:fillRef idx="1">
+            <a:schemeClr val="accent1"/>
+          </a:fillRef>
+          <a:effectRef idx="0">
+            <a:schemeClr val="accent1"/>
+          </a:effectRef>
+          <a:fontRef idx="minor">
+            <a:schemeClr val="lt1"/>
+          </a:fontRef>
+        </p:style>
+        <p:txBody>
+          <a:bodyPr rtlCol="0" anchor="ctr"/>
+          <a:lstStyle/>
+          <a:p>
+            <a:pPr algn="ctr"/>
+            <a:endParaRPr lang="en-US"/>
+          </a:p>
+        </p:txBody>
+      </p:sp>
+      <p:sp>
+        <p:nvSpPr>
+          <p:cNvPr id="20" name="Isosceles Triangle 19">
+            <a:extLst>
+              <a:ext uri="{FF2B5EF4-FFF2-40B4-BE49-F238E27FC236}">
+                <a16:creationId xmlns:a16="http://schemas.microsoft.com/office/drawing/2014/main" id="{3ECA69A1-7536-43AC-85EF-C7106179F5ED}"/>
+              </a:ext>
+              <a:ext uri="{C183D7F6-B498-43B3-948B-1728B52AA6E4}">
+                <adec:decorative xmlns:adec="http://schemas.microsoft.com/office/drawing/2017/decorative" val="1"/>
+              </a:ext>
+            </a:extLst>
+          </p:cNvPr>
+          <p:cNvSpPr>
+            <a:spLocks noGrp="1" noRot="1" noChangeAspect="1" noMove="1" noResize="1" noEditPoints="1" noAdjustHandles="1" noChangeArrowheads="1" noChangeShapeType="1" noTextEdit="1"/>
+          </p:cNvSpPr>
+          <p:nvPr>
+            <p:extLst>
+              <p:ext uri="{386F3935-93C4-4BCD-93E2-E3B085C9AB24}">
+                <p16:designElem xmlns:p16="http://schemas.microsoft.com/office/powerpoint/2015/main" val="1"/>
+              </p:ext>
+            </p:extLst>
+          </p:nvPr>
+        </p:nvSpPr>
+        <p:spPr>
+          <a:xfrm flipH="1">
+            <a:off x="7604080" y="6453143"/>
+            <a:ext cx="814903" cy="404857"/>
+          </a:xfrm>
+          <a:prstGeom prst="triangle">
+            <a:avLst/>
+          </a:prstGeom>
+          <a:solidFill>
+            <a:schemeClr val="accent1">
+              <a:alpha val="30000"/>
+            </a:schemeClr>
+          </a:solidFill>
+          <a:ln>
+            <a:noFill/>
+          </a:ln>
+        </p:spPr>
+        <p:style>
+          <a:lnRef idx="2">
+            <a:schemeClr val="accent1">
+              <a:shade val="50000"/>
+            </a:schemeClr>
+          </a:lnRef>
+          <a:fillRef idx="1">
+            <a:schemeClr val="accent1"/>
+          </a:fillRef>
+          <a:effectRef idx="0">
+            <a:schemeClr val="accent1"/>
+          </a:effectRef>
+          <a:fontRef idx="minor">
+            <a:schemeClr val="lt1"/>
+          </a:fontRef>
+        </p:style>
+        <p:txBody>
+          <a:bodyPr rtlCol="0" anchor="ctr"/>
+          <a:lstStyle/>
+          <a:p>
+            <a:pPr algn="ctr"/>
+            <a:endParaRPr lang="en-US"/>
+          </a:p>
+        </p:txBody>
+      </p:sp>
+      <p:sp>
+        <p:nvSpPr>
+          <p:cNvPr id="2" name="TextBox 1">
+            <a:extLst>
+              <a:ext uri="{FF2B5EF4-FFF2-40B4-BE49-F238E27FC236}">
+                <a16:creationId xmlns:a16="http://schemas.microsoft.com/office/drawing/2014/main" id="{3A3D9B53-75DC-4730-969C-A632179CC074}"/>
+              </a:ext>
+            </a:extLst>
+          </p:cNvPr>
+          <p:cNvSpPr txBox="1"/>
+          <p:nvPr/>
+        </p:nvSpPr>
+        <p:spPr>
+          <a:xfrm>
+            <a:off x="7058219" y="153482"/>
+            <a:ext cx="4398727" cy="6801862"/>
+          </a:xfrm>
+          <a:prstGeom prst="rect">
+            <a:avLst/>
+          </a:prstGeom>
+          <a:noFill/>
+        </p:spPr>
+        <p:txBody>
+          <a:bodyPr wrap="square" rtlCol="0">
+            <a:spAutoFit/>
+          </a:bodyPr>
+          <a:lstStyle/>
+          <a:p>
+            <a:pPr marL="342900" indent="-342900">
+              <a:buFont typeface="+mj-lt"/>
+              <a:buAutoNum type="arabicPeriod"/>
+            </a:pPr>
+            <a:r>
+              <a:rPr lang="es-ES" sz="1600" b="1" dirty="0" err="1"/>
+              <a:t>Select</a:t>
+            </a:r>
+            <a:r>
+              <a:rPr lang="es-ES" sz="1600" b="1" dirty="0"/>
+              <a:t> </a:t>
+            </a:r>
+            <a:r>
+              <a:rPr lang="es-ES" sz="1600" b="1" dirty="0" err="1"/>
+              <a:t>your</a:t>
+            </a:r>
+            <a:r>
+              <a:rPr lang="es-ES" sz="1600" b="1" dirty="0"/>
+              <a:t> preset</a:t>
+            </a:r>
+            <a:r>
+              <a:rPr lang="es-ES" sz="1600" dirty="0"/>
+              <a:t> </a:t>
+            </a:r>
+            <a:r>
+              <a:rPr lang="es-ES" sz="1600" dirty="0" err="1"/>
+              <a:t>using</a:t>
+            </a:r>
+            <a:r>
+              <a:rPr lang="es-ES" sz="1600" dirty="0"/>
+              <a:t> “</a:t>
+            </a:r>
+            <a:r>
+              <a:rPr lang="es-ES" sz="1600" dirty="0" err="1"/>
+              <a:t>Compression</a:t>
+            </a:r>
+            <a:r>
+              <a:rPr lang="es-ES" sz="1600" dirty="0"/>
+              <a:t> </a:t>
+            </a:r>
+            <a:r>
+              <a:rPr lang="es-ES" sz="1600" dirty="0" err="1"/>
+              <a:t>Level</a:t>
+            </a:r>
+            <a:r>
+              <a:rPr lang="es-ES" sz="1600" dirty="0"/>
+              <a:t>” </a:t>
+            </a:r>
+            <a:r>
+              <a:rPr lang="es-ES" sz="1600" dirty="0" err="1"/>
+              <a:t>Increment</a:t>
+            </a:r>
+            <a:r>
+              <a:rPr lang="es-ES" sz="1600" dirty="0"/>
+              <a:t>/</a:t>
+            </a:r>
+            <a:r>
+              <a:rPr lang="es-ES" sz="1600" dirty="0" err="1"/>
+              <a:t>Decrement</a:t>
+            </a:r>
+            <a:r>
+              <a:rPr lang="es-ES" sz="1600" dirty="0"/>
+              <a:t> </a:t>
+            </a:r>
+            <a:r>
+              <a:rPr lang="es-ES" sz="1600" dirty="0" err="1"/>
+              <a:t>button</a:t>
+            </a:r>
+            <a:r>
+              <a:rPr lang="es-ES" sz="1600" dirty="0"/>
+              <a:t>. </a:t>
+            </a:r>
+            <a:r>
+              <a:rPr lang="es-ES" sz="1600" dirty="0" err="1"/>
+              <a:t>Choose</a:t>
+            </a:r>
+            <a:r>
+              <a:rPr lang="es-ES" sz="1600" dirty="0"/>
+              <a:t> a </a:t>
+            </a:r>
+            <a:r>
+              <a:rPr lang="es-ES" sz="1600" dirty="0" err="1"/>
+              <a:t>lower</a:t>
+            </a:r>
+            <a:r>
+              <a:rPr lang="es-ES" sz="1600" dirty="0"/>
+              <a:t> preset </a:t>
+            </a:r>
+            <a:r>
+              <a:rPr lang="es-ES" sz="1600" dirty="0" err="1"/>
+              <a:t>for</a:t>
+            </a:r>
+            <a:r>
+              <a:rPr lang="es-ES" sz="1600" dirty="0"/>
+              <a:t> a </a:t>
+            </a:r>
+            <a:r>
+              <a:rPr lang="es-ES" sz="1600" dirty="0" err="1"/>
+              <a:t>less</a:t>
+            </a:r>
+            <a:r>
+              <a:rPr lang="es-ES" sz="1600" dirty="0"/>
+              <a:t> </a:t>
+            </a:r>
+            <a:r>
+              <a:rPr lang="es-ES" sz="1600" dirty="0" err="1"/>
+              <a:t>compressed</a:t>
+            </a:r>
+            <a:r>
+              <a:rPr lang="es-ES" sz="1600" dirty="0"/>
+              <a:t> </a:t>
+            </a:r>
+            <a:r>
+              <a:rPr lang="es-ES" sz="1600" dirty="0" err="1"/>
+              <a:t>voice</a:t>
+            </a:r>
+            <a:r>
+              <a:rPr lang="es-ES" sz="1600" dirty="0"/>
+              <a:t> and a </a:t>
+            </a:r>
+            <a:r>
+              <a:rPr lang="es-ES" sz="1600" dirty="0" err="1"/>
+              <a:t>higher</a:t>
+            </a:r>
+            <a:r>
+              <a:rPr lang="es-ES" sz="1600" dirty="0"/>
+              <a:t> </a:t>
+            </a:r>
+            <a:r>
+              <a:rPr lang="es-ES" sz="1600" dirty="0" err="1"/>
+              <a:t>one</a:t>
+            </a:r>
+            <a:r>
+              <a:rPr lang="es-ES" sz="1600" dirty="0"/>
+              <a:t> </a:t>
+            </a:r>
+            <a:r>
+              <a:rPr lang="es-ES" sz="1600" dirty="0" err="1"/>
+              <a:t>for</a:t>
+            </a:r>
+            <a:r>
+              <a:rPr lang="es-ES" sz="1600" dirty="0"/>
+              <a:t> a more </a:t>
+            </a:r>
+            <a:r>
+              <a:rPr lang="es-ES" sz="1600" dirty="0" err="1"/>
+              <a:t>compressed</a:t>
+            </a:r>
+            <a:r>
+              <a:rPr lang="es-ES" sz="1600" dirty="0"/>
+              <a:t> output.</a:t>
+            </a:r>
+          </a:p>
+          <a:p>
+            <a:pPr marL="342900" indent="-342900">
+              <a:buFont typeface="+mj-lt"/>
+              <a:buAutoNum type="arabicPeriod"/>
+            </a:pPr>
+            <a:r>
+              <a:rPr lang="es-ES" sz="1600" b="1" dirty="0" err="1"/>
+              <a:t>Choose</a:t>
+            </a:r>
+            <a:r>
+              <a:rPr lang="es-ES" sz="1600" b="1" dirty="0"/>
+              <a:t> </a:t>
+            </a:r>
+            <a:r>
+              <a:rPr lang="es-ES" sz="1600" b="1" dirty="0" err="1"/>
+              <a:t>either</a:t>
+            </a:r>
+            <a:r>
+              <a:rPr lang="es-ES" sz="1600" b="1" dirty="0"/>
+              <a:t> </a:t>
+            </a:r>
+            <a:r>
+              <a:rPr lang="es-ES" sz="1600" b="1" dirty="0" err="1"/>
+              <a:t>Auto-threshold</a:t>
+            </a:r>
+            <a:r>
+              <a:rPr lang="es-ES" sz="1600" dirty="0"/>
+              <a:t> </a:t>
+            </a:r>
+            <a:r>
+              <a:rPr lang="es-ES" sz="1600" dirty="0" err="1"/>
+              <a:t>option</a:t>
+            </a:r>
+            <a:r>
+              <a:rPr lang="es-ES" sz="1600" dirty="0"/>
+              <a:t> </a:t>
+            </a:r>
+            <a:r>
+              <a:rPr lang="es-ES" sz="1600" b="1" dirty="0" err="1"/>
+              <a:t>or</a:t>
+            </a:r>
+            <a:r>
+              <a:rPr lang="es-ES" sz="1600" b="1" dirty="0"/>
+              <a:t> manual </a:t>
+            </a:r>
+            <a:r>
+              <a:rPr lang="es-ES" sz="1600" b="1" dirty="0" err="1"/>
+              <a:t>configuration</a:t>
+            </a:r>
+            <a:r>
+              <a:rPr lang="es-ES" sz="1600" dirty="0"/>
+              <a:t>. </a:t>
+            </a:r>
+            <a:r>
+              <a:rPr lang="es-ES" sz="1600" b="1" dirty="0" err="1"/>
+              <a:t>If</a:t>
+            </a:r>
+            <a:r>
+              <a:rPr lang="es-ES" sz="1600" b="1" dirty="0"/>
+              <a:t> auto </a:t>
+            </a:r>
+            <a:r>
+              <a:rPr lang="es-ES" sz="1600" b="1" dirty="0" err="1"/>
+              <a:t>option</a:t>
+            </a:r>
+            <a:r>
+              <a:rPr lang="es-ES" sz="1600" b="1" dirty="0"/>
+              <a:t> </a:t>
+            </a:r>
+            <a:r>
+              <a:rPr lang="es-ES" sz="1600" b="1" dirty="0" err="1"/>
+              <a:t>is</a:t>
+            </a:r>
+            <a:r>
+              <a:rPr lang="es-ES" sz="1600" b="1" dirty="0"/>
+              <a:t> </a:t>
+            </a:r>
+            <a:r>
+              <a:rPr lang="es-ES" sz="1600" b="1" dirty="0" err="1"/>
+              <a:t>chosen</a:t>
+            </a:r>
+            <a:r>
+              <a:rPr lang="es-ES" sz="1600" b="1" dirty="0"/>
+              <a:t> </a:t>
+            </a:r>
+            <a:r>
+              <a:rPr lang="es-ES" sz="1600" b="1" dirty="0" err="1"/>
+              <a:t>turn</a:t>
+            </a:r>
+            <a:r>
+              <a:rPr lang="es-ES" sz="1600" b="1" dirty="0"/>
+              <a:t> </a:t>
+            </a:r>
+            <a:r>
+              <a:rPr lang="es-ES" sz="1600" b="1" dirty="0" err="1"/>
+              <a:t>it</a:t>
+            </a:r>
+            <a:r>
+              <a:rPr lang="es-ES" sz="1600" b="1" dirty="0"/>
+              <a:t> </a:t>
+            </a:r>
+            <a:r>
+              <a:rPr lang="es-ES" sz="1600" b="1" dirty="0" err="1"/>
+              <a:t>on</a:t>
+            </a:r>
+            <a:r>
+              <a:rPr lang="es-ES" sz="1600" b="1" dirty="0"/>
+              <a:t> and </a:t>
+            </a:r>
+            <a:r>
+              <a:rPr lang="es-ES" sz="1600" b="1" dirty="0" err="1"/>
+              <a:t>go</a:t>
+            </a:r>
+            <a:r>
+              <a:rPr lang="es-ES" sz="1600" b="1" dirty="0"/>
+              <a:t> </a:t>
+            </a:r>
+            <a:r>
+              <a:rPr lang="es-ES" sz="1600" b="1" dirty="0" err="1"/>
+              <a:t>straight</a:t>
+            </a:r>
+            <a:r>
+              <a:rPr lang="es-ES" sz="1600" b="1" dirty="0"/>
+              <a:t> </a:t>
+            </a:r>
+            <a:r>
+              <a:rPr lang="es-ES" sz="1600" b="1" dirty="0" err="1"/>
+              <a:t>to</a:t>
+            </a:r>
+            <a:r>
+              <a:rPr lang="es-ES" sz="1600" b="1" dirty="0"/>
+              <a:t> </a:t>
+            </a:r>
+            <a:r>
+              <a:rPr lang="es-ES" sz="1600" b="1" dirty="0" err="1"/>
+              <a:t>point</a:t>
+            </a:r>
+            <a:r>
+              <a:rPr lang="es-ES" sz="1600" b="1" dirty="0"/>
+              <a:t> 3</a:t>
+            </a:r>
+            <a:r>
+              <a:rPr lang="es-ES" sz="1600" dirty="0"/>
+              <a:t>, </a:t>
+            </a:r>
+            <a:r>
+              <a:rPr lang="es-ES" sz="1600" dirty="0" err="1"/>
+              <a:t>else</a:t>
+            </a:r>
+            <a:r>
+              <a:rPr lang="es-ES" sz="1600" dirty="0"/>
+              <a:t> </a:t>
+            </a:r>
+            <a:r>
+              <a:rPr lang="es-ES" sz="1600" b="1" dirty="0" err="1"/>
+              <a:t>If</a:t>
+            </a:r>
+            <a:r>
+              <a:rPr lang="es-ES" sz="1600" b="1" dirty="0"/>
+              <a:t> </a:t>
+            </a:r>
+            <a:r>
+              <a:rPr lang="es-ES" sz="1600" b="1" dirty="0" err="1"/>
+              <a:t>you</a:t>
+            </a:r>
+            <a:r>
+              <a:rPr lang="es-ES" sz="1600" b="1" dirty="0"/>
+              <a:t> decide </a:t>
+            </a:r>
+            <a:r>
+              <a:rPr lang="es-ES" sz="1600" b="1" dirty="0" err="1"/>
+              <a:t>to</a:t>
+            </a:r>
+            <a:r>
+              <a:rPr lang="es-ES" sz="1600" b="1" dirty="0"/>
+              <a:t> </a:t>
+            </a:r>
+            <a:r>
+              <a:rPr lang="es-ES" sz="1600" b="1" dirty="0" err="1"/>
+              <a:t>adjust</a:t>
+            </a:r>
+            <a:r>
+              <a:rPr lang="es-ES" sz="1600" b="1" dirty="0"/>
+              <a:t> </a:t>
+            </a:r>
+            <a:r>
+              <a:rPr lang="es-ES" sz="1600" b="1" dirty="0" err="1"/>
+              <a:t>it</a:t>
+            </a:r>
+            <a:r>
+              <a:rPr lang="es-ES" sz="1600" b="1" dirty="0"/>
+              <a:t> </a:t>
+            </a:r>
+            <a:r>
+              <a:rPr lang="es-ES" sz="1600" b="1" dirty="0" err="1"/>
+              <a:t>manually</a:t>
+            </a:r>
+            <a:r>
+              <a:rPr lang="es-ES" sz="1600" dirty="0"/>
+              <a:t>: </a:t>
+            </a:r>
+          </a:p>
+          <a:p>
+            <a:pPr marL="800100" lvl="1" indent="-342900">
+              <a:buFont typeface="+mj-lt"/>
+              <a:buAutoNum type="arabicPeriod"/>
+            </a:pPr>
+            <a:r>
+              <a:rPr lang="es-ES" sz="1600" dirty="0" err="1"/>
+              <a:t>Turn</a:t>
+            </a:r>
+            <a:r>
+              <a:rPr lang="es-ES" sz="1600" dirty="0"/>
+              <a:t> off Auto-Threshold and set </a:t>
+            </a:r>
+            <a:r>
+              <a:rPr lang="es-ES" sz="1600" dirty="0" err="1"/>
+              <a:t>Compression</a:t>
+            </a:r>
+            <a:r>
+              <a:rPr lang="es-ES" sz="1600" dirty="0"/>
+              <a:t> </a:t>
+            </a:r>
+            <a:r>
+              <a:rPr lang="es-ES" sz="1600" dirty="0" err="1"/>
+              <a:t>level</a:t>
+            </a:r>
+            <a:r>
+              <a:rPr lang="es-ES" sz="1600" dirty="0"/>
+              <a:t> </a:t>
+            </a:r>
+            <a:r>
+              <a:rPr lang="es-ES" sz="1600" dirty="0" err="1"/>
+              <a:t>to</a:t>
+            </a:r>
+            <a:r>
+              <a:rPr lang="es-ES" sz="1600" dirty="0"/>
+              <a:t> 3.</a:t>
+            </a:r>
+          </a:p>
+          <a:p>
+            <a:pPr marL="800100" lvl="1" indent="-342900">
+              <a:buFont typeface="+mj-lt"/>
+              <a:buAutoNum type="arabicPeriod"/>
+            </a:pPr>
+            <a:r>
+              <a:rPr lang="es-ES" sz="1600" dirty="0"/>
+              <a:t>try </a:t>
+            </a:r>
+            <a:r>
+              <a:rPr lang="es-ES" sz="1600" dirty="0" err="1"/>
+              <a:t>to</a:t>
+            </a:r>
+            <a:r>
+              <a:rPr lang="es-ES" sz="1600" dirty="0"/>
+              <a:t> </a:t>
+            </a:r>
+            <a:r>
+              <a:rPr lang="es-ES" sz="1600" dirty="0" err="1"/>
+              <a:t>reach</a:t>
+            </a:r>
+            <a:r>
+              <a:rPr lang="es-ES" sz="1600" dirty="0"/>
+              <a:t> “-3db” </a:t>
+            </a:r>
+            <a:r>
+              <a:rPr lang="es-ES" sz="1600" dirty="0" err="1"/>
+              <a:t>gain</a:t>
+            </a:r>
+            <a:r>
+              <a:rPr lang="es-ES" sz="1600" dirty="0"/>
+              <a:t> </a:t>
+            </a:r>
+            <a:r>
+              <a:rPr lang="es-ES" sz="1600" dirty="0" err="1"/>
+              <a:t>reduction</a:t>
+            </a:r>
+            <a:r>
+              <a:rPr lang="es-ES" sz="1600" dirty="0"/>
+              <a:t> and </a:t>
+            </a:r>
+            <a:r>
+              <a:rPr lang="es-ES" sz="1600" dirty="0" err="1"/>
+              <a:t>keep</a:t>
+            </a:r>
+            <a:r>
+              <a:rPr lang="es-ES" sz="1600" dirty="0"/>
+              <a:t> </a:t>
+            </a:r>
+            <a:r>
+              <a:rPr lang="es-ES" sz="1600" dirty="0" err="1"/>
+              <a:t>the</a:t>
+            </a:r>
+            <a:r>
+              <a:rPr lang="es-ES" sz="1600" dirty="0"/>
+              <a:t> </a:t>
+            </a:r>
+            <a:r>
+              <a:rPr lang="es-ES" sz="1600" dirty="0" err="1"/>
+              <a:t>square</a:t>
+            </a:r>
+            <a:r>
+              <a:rPr lang="es-ES" sz="1600" dirty="0"/>
+              <a:t> </a:t>
+            </a:r>
+            <a:r>
+              <a:rPr lang="es-ES" sz="1600" dirty="0" err="1"/>
+              <a:t>on</a:t>
+            </a:r>
+            <a:r>
+              <a:rPr lang="es-ES" sz="1600" dirty="0"/>
+              <a:t> </a:t>
+            </a:r>
+            <a:r>
+              <a:rPr lang="es-ES" sz="1600" dirty="0" err="1"/>
+              <a:t>green</a:t>
+            </a:r>
+            <a:r>
+              <a:rPr lang="es-ES" sz="1600" dirty="0"/>
+              <a:t> – </a:t>
+            </a:r>
+            <a:r>
+              <a:rPr lang="es-ES" sz="1600" dirty="0" err="1"/>
+              <a:t>greenyellow</a:t>
+            </a:r>
+            <a:r>
+              <a:rPr lang="es-ES" sz="1600" dirty="0"/>
+              <a:t> color </a:t>
+            </a:r>
+            <a:r>
+              <a:rPr lang="es-ES" sz="1600" dirty="0" err="1"/>
+              <a:t>values</a:t>
+            </a:r>
+            <a:r>
+              <a:rPr lang="es-ES" sz="1600" dirty="0"/>
+              <a:t> </a:t>
+            </a:r>
+            <a:r>
+              <a:rPr lang="es-ES" sz="1600" dirty="0" err="1"/>
+              <a:t>limiting</a:t>
+            </a:r>
+            <a:r>
+              <a:rPr lang="es-ES" sz="1600" dirty="0"/>
+              <a:t> input </a:t>
+            </a:r>
+            <a:r>
+              <a:rPr lang="es-ES" sz="1600" dirty="0" err="1"/>
+              <a:t>signal</a:t>
+            </a:r>
+            <a:r>
+              <a:rPr lang="es-ES" sz="1600" dirty="0"/>
+              <a:t> </a:t>
+            </a:r>
+            <a:r>
+              <a:rPr lang="es-ES" sz="1600" dirty="0" err="1"/>
+              <a:t>with</a:t>
+            </a:r>
+            <a:r>
+              <a:rPr lang="es-ES" sz="1600" dirty="0"/>
+              <a:t> threshold slider. </a:t>
+            </a:r>
+            <a:r>
+              <a:rPr lang="es-ES" sz="1600" dirty="0" err="1"/>
+              <a:t>Move</a:t>
+            </a:r>
+            <a:r>
+              <a:rPr lang="es-ES" sz="1600" dirty="0"/>
+              <a:t> </a:t>
+            </a:r>
+            <a:r>
+              <a:rPr lang="es-ES" sz="1600" dirty="0" err="1"/>
+              <a:t>it</a:t>
+            </a:r>
+            <a:r>
+              <a:rPr lang="es-ES" sz="1600" dirty="0"/>
+              <a:t> </a:t>
+            </a:r>
+            <a:r>
+              <a:rPr lang="es-ES" sz="1600" dirty="0" err="1"/>
+              <a:t>while</a:t>
+            </a:r>
+            <a:r>
+              <a:rPr lang="es-ES" sz="1600" dirty="0"/>
+              <a:t> </a:t>
+            </a:r>
+            <a:r>
+              <a:rPr lang="es-ES" sz="1600" dirty="0" err="1"/>
+              <a:t>you</a:t>
+            </a:r>
+            <a:r>
+              <a:rPr lang="es-ES" sz="1600" dirty="0"/>
+              <a:t> </a:t>
+            </a:r>
+            <a:r>
+              <a:rPr lang="es-ES" sz="1600" dirty="0" err="1"/>
+              <a:t>speak</a:t>
+            </a:r>
+            <a:r>
+              <a:rPr lang="es-ES" sz="1600" dirty="0"/>
+              <a:t> and look </a:t>
+            </a:r>
+            <a:r>
+              <a:rPr lang="es-ES" sz="1600" dirty="0" err="1"/>
+              <a:t>for</a:t>
+            </a:r>
+            <a:r>
+              <a:rPr lang="es-ES" sz="1600" dirty="0"/>
+              <a:t> </a:t>
+            </a:r>
+            <a:r>
+              <a:rPr lang="es-ES" sz="1600" dirty="0" err="1"/>
+              <a:t>green</a:t>
+            </a:r>
+            <a:r>
+              <a:rPr lang="es-ES" sz="1600" dirty="0"/>
+              <a:t> </a:t>
+            </a:r>
+            <a:r>
+              <a:rPr lang="es-ES" sz="1600" dirty="0" err="1"/>
+              <a:t>colour</a:t>
+            </a:r>
+            <a:r>
+              <a:rPr lang="es-ES" sz="1600" dirty="0"/>
+              <a:t> </a:t>
+            </a:r>
+            <a:r>
+              <a:rPr lang="es-ES" sz="1600" dirty="0" err="1"/>
+              <a:t>on</a:t>
+            </a:r>
+            <a:r>
+              <a:rPr lang="es-ES" sz="1600" dirty="0"/>
+              <a:t> </a:t>
+            </a:r>
+            <a:r>
+              <a:rPr lang="es-ES" sz="1600" dirty="0" err="1"/>
+              <a:t>the</a:t>
+            </a:r>
+            <a:r>
+              <a:rPr lang="es-ES" sz="1600" dirty="0"/>
+              <a:t> </a:t>
+            </a:r>
+            <a:r>
+              <a:rPr lang="es-ES" sz="1600" dirty="0" err="1"/>
+              <a:t>square</a:t>
+            </a:r>
+            <a:r>
+              <a:rPr lang="es-ES" sz="1600" dirty="0"/>
+              <a:t>.</a:t>
+            </a:r>
+          </a:p>
+          <a:p>
+            <a:pPr marL="342900" indent="-342900">
+              <a:buFont typeface="+mj-lt"/>
+              <a:buAutoNum type="arabicPeriod"/>
+            </a:pPr>
+            <a:r>
+              <a:rPr lang="es-ES" sz="1600" b="1" dirty="0" err="1"/>
+              <a:t>Adjust</a:t>
+            </a:r>
+            <a:r>
+              <a:rPr lang="es-ES" sz="1600" b="1" dirty="0"/>
+              <a:t> “</a:t>
+            </a:r>
+            <a:r>
+              <a:rPr lang="es-ES" sz="1600" b="1" dirty="0" err="1"/>
+              <a:t>Volume</a:t>
+            </a:r>
+            <a:r>
+              <a:rPr lang="es-ES" sz="1600" b="1" dirty="0"/>
+              <a:t> </a:t>
+            </a:r>
+            <a:r>
+              <a:rPr lang="es-ES" sz="1600" b="1" dirty="0" err="1"/>
+              <a:t>Out</a:t>
+            </a:r>
+            <a:r>
+              <a:rPr lang="es-ES" sz="1600" b="1" dirty="0"/>
+              <a:t>”</a:t>
+            </a:r>
+            <a:r>
+              <a:rPr lang="es-ES" sz="1600" dirty="0"/>
+              <a:t> in </a:t>
+            </a:r>
+            <a:r>
+              <a:rPr lang="es-ES" sz="1600" dirty="0" err="1"/>
+              <a:t>order</a:t>
+            </a:r>
+            <a:r>
+              <a:rPr lang="es-ES" sz="1600" dirty="0"/>
+              <a:t> </a:t>
+            </a:r>
+            <a:r>
+              <a:rPr lang="es-ES" sz="1600" dirty="0" err="1"/>
+              <a:t>to</a:t>
+            </a:r>
+            <a:r>
+              <a:rPr lang="es-ES" sz="1600" dirty="0"/>
+              <a:t> </a:t>
+            </a:r>
+            <a:r>
+              <a:rPr lang="es-ES" sz="1600" dirty="0" err="1"/>
+              <a:t>keep</a:t>
+            </a:r>
+            <a:r>
+              <a:rPr lang="es-ES" sz="1600" dirty="0"/>
+              <a:t> </a:t>
+            </a:r>
+            <a:r>
+              <a:rPr lang="es-ES" sz="1600" dirty="0" err="1"/>
+              <a:t>green</a:t>
+            </a:r>
+            <a:r>
+              <a:rPr lang="es-ES" sz="1600" dirty="0"/>
+              <a:t> </a:t>
+            </a:r>
+            <a:r>
+              <a:rPr lang="es-ES" sz="1600" dirty="0" err="1"/>
+              <a:t>metering</a:t>
+            </a:r>
+            <a:r>
+              <a:rPr lang="es-ES" sz="1600" dirty="0"/>
+              <a:t> in OBS, </a:t>
+            </a:r>
+            <a:r>
+              <a:rPr lang="es-ES" sz="1600" dirty="0" err="1"/>
+              <a:t>next</a:t>
+            </a:r>
+            <a:r>
+              <a:rPr lang="es-ES" sz="1600" dirty="0"/>
+              <a:t> step </a:t>
+            </a:r>
+            <a:r>
+              <a:rPr lang="es-ES" sz="1600" dirty="0" err="1"/>
+              <a:t>on</a:t>
+            </a:r>
+            <a:r>
+              <a:rPr lang="es-ES" sz="1600" dirty="0"/>
+              <a:t> </a:t>
+            </a:r>
+            <a:r>
+              <a:rPr lang="es-ES" sz="1600" dirty="0" err="1"/>
+              <a:t>your</a:t>
+            </a:r>
+            <a:r>
+              <a:rPr lang="es-ES" sz="1600" dirty="0"/>
+              <a:t> audio </a:t>
+            </a:r>
+            <a:r>
+              <a:rPr lang="es-ES" sz="1600" dirty="0" err="1"/>
+              <a:t>chain</a:t>
+            </a:r>
+            <a:endParaRPr lang="es-ES" sz="1600" dirty="0"/>
+          </a:p>
+          <a:p>
+            <a:pPr marL="342900" indent="-342900">
+              <a:buFont typeface="+mj-lt"/>
+              <a:buAutoNum type="arabicPeriod"/>
+            </a:pPr>
+            <a:r>
+              <a:rPr lang="es-ES" sz="1600" dirty="0" err="1"/>
+              <a:t>Choose</a:t>
+            </a:r>
+            <a:r>
+              <a:rPr lang="es-ES" sz="1600" dirty="0"/>
+              <a:t> </a:t>
+            </a:r>
+            <a:r>
+              <a:rPr lang="es-ES" sz="1600" b="1" dirty="0" err="1"/>
+              <a:t>filtering</a:t>
+            </a:r>
+            <a:r>
+              <a:rPr lang="es-ES" sz="1600" b="1" dirty="0"/>
+              <a:t> </a:t>
+            </a:r>
+            <a:r>
+              <a:rPr lang="es-ES" sz="1600" b="1" dirty="0" err="1"/>
+              <a:t>your</a:t>
+            </a:r>
+            <a:r>
+              <a:rPr lang="es-ES" sz="1600" b="1" dirty="0"/>
+              <a:t> </a:t>
+            </a:r>
+            <a:r>
+              <a:rPr lang="es-ES" sz="1600" b="1" dirty="0" err="1"/>
+              <a:t>voice</a:t>
+            </a:r>
+            <a:r>
+              <a:rPr lang="es-ES" sz="1600" b="1" dirty="0"/>
+              <a:t> </a:t>
+            </a:r>
+            <a:r>
+              <a:rPr lang="es-ES" sz="1600" b="1" dirty="0" err="1"/>
+              <a:t>with</a:t>
+            </a:r>
+            <a:r>
+              <a:rPr lang="es-ES" sz="1600" b="1" dirty="0"/>
+              <a:t> a high pass</a:t>
+            </a:r>
+            <a:r>
+              <a:rPr lang="es-ES" sz="1600" dirty="0"/>
+              <a:t> filter </a:t>
+            </a:r>
+            <a:r>
+              <a:rPr lang="es-ES" sz="1600" dirty="0" err="1"/>
+              <a:t>or</a:t>
+            </a:r>
+            <a:r>
+              <a:rPr lang="es-ES" sz="1600" dirty="0"/>
+              <a:t> </a:t>
+            </a:r>
+            <a:r>
+              <a:rPr lang="es-ES" sz="1600" dirty="0" err="1"/>
+              <a:t>let</a:t>
+            </a:r>
+            <a:r>
+              <a:rPr lang="es-ES" sz="1600" dirty="0"/>
+              <a:t> </a:t>
+            </a:r>
+            <a:r>
+              <a:rPr lang="es-ES" sz="1600" dirty="0" err="1"/>
+              <a:t>it</a:t>
+            </a:r>
+            <a:r>
+              <a:rPr lang="es-ES" sz="1600" dirty="0"/>
+              <a:t> be….</a:t>
+            </a:r>
+          </a:p>
+          <a:p>
+            <a:pPr marL="342900" indent="-342900">
+              <a:buFont typeface="+mj-lt"/>
+              <a:buAutoNum type="arabicPeriod"/>
+            </a:pPr>
+            <a:r>
+              <a:rPr lang="es-ES" sz="1600" dirty="0"/>
+              <a:t>Use </a:t>
+            </a:r>
+            <a:r>
+              <a:rPr lang="es-ES" sz="1600" b="1" dirty="0"/>
+              <a:t>Bypass </a:t>
+            </a:r>
+            <a:r>
+              <a:rPr lang="es-ES" sz="1600" b="1" dirty="0" err="1"/>
+              <a:t>to</a:t>
+            </a:r>
+            <a:r>
+              <a:rPr lang="es-ES" sz="1600" b="1" dirty="0"/>
+              <a:t> </a:t>
+            </a:r>
+            <a:r>
+              <a:rPr lang="es-ES" sz="1600" b="1" dirty="0" err="1"/>
+              <a:t>check</a:t>
+            </a:r>
+            <a:r>
+              <a:rPr lang="es-ES" sz="1600" b="1" dirty="0"/>
+              <a:t> </a:t>
+            </a:r>
+            <a:r>
+              <a:rPr lang="es-ES" sz="1600" dirty="0" err="1"/>
+              <a:t>difference</a:t>
+            </a:r>
+            <a:r>
+              <a:rPr lang="es-ES" sz="1600" dirty="0"/>
+              <a:t> </a:t>
+            </a:r>
+            <a:r>
+              <a:rPr lang="es-ES" sz="1600" dirty="0" err="1"/>
+              <a:t>between</a:t>
+            </a:r>
+            <a:r>
+              <a:rPr lang="es-ES" sz="1600" dirty="0"/>
+              <a:t> </a:t>
+            </a:r>
+            <a:r>
+              <a:rPr lang="es-ES" sz="1600" dirty="0" err="1"/>
+              <a:t>your</a:t>
+            </a:r>
+            <a:r>
+              <a:rPr lang="es-ES" sz="1600" dirty="0"/>
+              <a:t> </a:t>
+            </a:r>
+            <a:r>
+              <a:rPr lang="es-ES" sz="1600" dirty="0" err="1"/>
+              <a:t>favourite</a:t>
+            </a:r>
+            <a:r>
+              <a:rPr lang="es-ES" sz="1600" dirty="0"/>
+              <a:t> </a:t>
+            </a:r>
+            <a:r>
+              <a:rPr lang="es-ES" sz="1600" dirty="0" err="1"/>
+              <a:t>configurations</a:t>
+            </a:r>
+            <a:r>
+              <a:rPr lang="es-ES" sz="1600" dirty="0"/>
+              <a:t>!</a:t>
+            </a:r>
+          </a:p>
+          <a:p>
+            <a:pPr marL="342900" indent="-342900">
+              <a:buFont typeface="+mj-lt"/>
+              <a:buAutoNum type="arabicPeriod"/>
+            </a:pPr>
+            <a:r>
+              <a:rPr lang="es-ES" sz="1600" dirty="0" err="1"/>
+              <a:t>Enjoy</a:t>
+            </a:r>
+            <a:r>
+              <a:rPr lang="es-ES" sz="1600" dirty="0"/>
+              <a:t> </a:t>
+            </a:r>
+            <a:r>
+              <a:rPr lang="es-ES" sz="1600" b="1" dirty="0" err="1"/>
+              <a:t>trying</a:t>
+            </a:r>
+            <a:r>
+              <a:rPr lang="es-ES" sz="1600" b="1" dirty="0"/>
+              <a:t> </a:t>
+            </a:r>
+            <a:r>
+              <a:rPr lang="es-ES" sz="1600" b="1" dirty="0" err="1"/>
+              <a:t>different</a:t>
+            </a:r>
+            <a:r>
+              <a:rPr lang="es-ES" sz="1600" b="1" dirty="0"/>
+              <a:t> </a:t>
+            </a:r>
+            <a:r>
+              <a:rPr lang="es-ES" sz="1600" b="1" dirty="0" err="1"/>
+              <a:t>values</a:t>
+            </a:r>
+            <a:r>
+              <a:rPr lang="es-ES" sz="1600" b="1" dirty="0"/>
+              <a:t> </a:t>
+            </a:r>
+            <a:r>
+              <a:rPr lang="es-ES" sz="1600" b="1" dirty="0" err="1"/>
+              <a:t>of</a:t>
+            </a:r>
+            <a:r>
+              <a:rPr lang="es-ES" sz="1600" b="1" dirty="0"/>
+              <a:t> </a:t>
+            </a:r>
+            <a:r>
+              <a:rPr lang="es-ES" sz="1600" b="1" dirty="0" err="1"/>
+              <a:t>compression</a:t>
+            </a:r>
+            <a:r>
+              <a:rPr lang="es-ES" sz="1600" b="1" dirty="0"/>
+              <a:t> </a:t>
+            </a:r>
+            <a:r>
+              <a:rPr lang="es-ES" sz="1600" b="1" dirty="0" err="1"/>
+              <a:t>level</a:t>
+            </a:r>
+            <a:r>
+              <a:rPr lang="es-ES" sz="1600" b="1" dirty="0"/>
+              <a:t> </a:t>
+            </a:r>
+            <a:r>
+              <a:rPr lang="es-ES" sz="1600" dirty="0"/>
+              <a:t>and </a:t>
+            </a:r>
+            <a:r>
+              <a:rPr lang="es-ES" sz="1600" dirty="0" err="1"/>
+              <a:t>choose</a:t>
+            </a:r>
+            <a:r>
+              <a:rPr lang="es-ES" sz="1600" dirty="0"/>
+              <a:t> </a:t>
+            </a:r>
+            <a:r>
+              <a:rPr lang="es-ES" sz="1600" dirty="0" err="1"/>
+              <a:t>the</a:t>
+            </a:r>
+            <a:r>
+              <a:rPr lang="es-ES" sz="1600" dirty="0"/>
+              <a:t> </a:t>
+            </a:r>
+            <a:r>
+              <a:rPr lang="es-ES" sz="1600" dirty="0" err="1"/>
+              <a:t>best</a:t>
+            </a:r>
+            <a:r>
+              <a:rPr lang="es-ES" sz="1600" dirty="0"/>
+              <a:t> </a:t>
+            </a:r>
+            <a:r>
+              <a:rPr lang="es-ES" sz="1600" dirty="0" err="1"/>
+              <a:t>for</a:t>
+            </a:r>
+            <a:r>
+              <a:rPr lang="es-ES" sz="1600" dirty="0"/>
+              <a:t> </a:t>
+            </a:r>
+            <a:r>
+              <a:rPr lang="es-ES" sz="1600" dirty="0" err="1"/>
+              <a:t>your</a:t>
+            </a:r>
+            <a:r>
+              <a:rPr lang="es-ES" sz="1600" dirty="0"/>
+              <a:t> </a:t>
+            </a:r>
+            <a:r>
+              <a:rPr lang="es-ES" sz="1600" dirty="0" err="1"/>
+              <a:t>voice</a:t>
+            </a:r>
+            <a:r>
+              <a:rPr lang="es-ES" sz="1600" dirty="0"/>
+              <a:t>! (</a:t>
+            </a:r>
+            <a:r>
+              <a:rPr lang="es-ES" sz="1600" dirty="0" err="1"/>
+              <a:t>Squeeze</a:t>
+            </a:r>
+            <a:r>
+              <a:rPr lang="es-ES" sz="1600" dirty="0"/>
+              <a:t>  Threshold </a:t>
+            </a:r>
+            <a:r>
+              <a:rPr lang="es-ES" sz="1600" dirty="0" err="1"/>
+              <a:t>for</a:t>
+            </a:r>
+            <a:r>
+              <a:rPr lang="es-ES" sz="1600" dirty="0"/>
+              <a:t> more </a:t>
+            </a:r>
+            <a:r>
+              <a:rPr lang="es-ES" sz="1600" dirty="0" err="1"/>
+              <a:t>compression</a:t>
+            </a:r>
+            <a:r>
+              <a:rPr lang="es-ES" sz="1600" dirty="0"/>
+              <a:t> </a:t>
+            </a:r>
+            <a:r>
+              <a:rPr lang="es-ES" sz="1600" dirty="0" err="1"/>
+              <a:t>with</a:t>
+            </a:r>
+            <a:r>
+              <a:rPr lang="es-ES" sz="1600" dirty="0"/>
+              <a:t> </a:t>
+            </a:r>
+            <a:r>
+              <a:rPr lang="es-ES" sz="1600" dirty="0" err="1"/>
+              <a:t>the</a:t>
+            </a:r>
+            <a:r>
+              <a:rPr lang="es-ES" sz="1600" dirty="0"/>
+              <a:t> preset </a:t>
+            </a:r>
+            <a:r>
+              <a:rPr lang="es-ES" sz="1600" dirty="0" err="1"/>
+              <a:t>of</a:t>
+            </a:r>
+            <a:r>
+              <a:rPr lang="es-ES" sz="1600" dirty="0"/>
+              <a:t> </a:t>
+            </a:r>
+            <a:r>
+              <a:rPr lang="es-ES" sz="1600" dirty="0" err="1"/>
+              <a:t>your</a:t>
+            </a:r>
+            <a:r>
+              <a:rPr lang="es-ES" sz="1600" dirty="0"/>
+              <a:t> </a:t>
+            </a:r>
+            <a:r>
+              <a:rPr lang="es-ES" sz="1600" dirty="0" err="1"/>
+              <a:t>choice</a:t>
+            </a:r>
+            <a:r>
+              <a:rPr lang="es-ES" sz="1600" dirty="0"/>
+              <a:t>!)</a:t>
+            </a:r>
+            <a:endParaRPr lang="es-ES" dirty="0"/>
+          </a:p>
+          <a:p>
+            <a:pPr marL="800100" lvl="1" indent="-342900">
+              <a:buFont typeface="+mj-lt"/>
+              <a:buAutoNum type="arabicPeriod"/>
+            </a:pPr>
+            <a:endParaRPr lang="es-ES" dirty="0"/>
+          </a:p>
+          <a:p>
+            <a:pPr marL="342900" indent="-342900">
+              <a:buFont typeface="+mj-lt"/>
+              <a:buAutoNum type="arabicPeriod"/>
+            </a:pPr>
+            <a:endParaRPr lang="es-ES" dirty="0"/>
+          </a:p>
+        </p:txBody>
+      </p:sp>
+      <p:pic>
+        <p:nvPicPr>
+          <p:cNvPr id="6" name="Picture 5" descr="Graphical user interface&#10;&#10;Description automatically generated">
+            <a:extLst>
+              <a:ext uri="{FF2B5EF4-FFF2-40B4-BE49-F238E27FC236}">
+                <a16:creationId xmlns:a16="http://schemas.microsoft.com/office/drawing/2014/main" id="{07EA0C0A-C30D-4178-B0C2-A948A3DFC1FB}"/>
+              </a:ext>
+            </a:extLst>
+          </p:cNvPr>
+          <p:cNvPicPr>
+            <a:picLocks noChangeAspect="1"/>
+          </p:cNvPicPr>
+          <p:nvPr/>
+        </p:nvPicPr>
+        <p:blipFill>
+          <a:blip r:embed="rId2">
+            <a:extLst>
+              <a:ext uri="{28A0092B-C50C-407E-A947-70E740481C1C}">
+                <a14:useLocalDpi xmlns:a14="http://schemas.microsoft.com/office/drawing/2010/main" val="0"/>
+              </a:ext>
+            </a:extLst>
+          </a:blip>
+          <a:stretch>
+            <a:fillRect/>
+          </a:stretch>
+        </p:blipFill>
+        <p:spPr>
+          <a:xfrm>
+            <a:off x="757980" y="428925"/>
+            <a:ext cx="5823499" cy="5924401"/>
+          </a:xfrm>
+          <a:prstGeom prst="rect">
+            <a:avLst/>
+          </a:prstGeom>
+        </p:spPr>
+      </p:pic>
+      <p:sp>
+        <p:nvSpPr>
+          <p:cNvPr id="15" name="Rectangle 14">
+            <a:extLst>
+              <a:ext uri="{FF2B5EF4-FFF2-40B4-BE49-F238E27FC236}">
+                <a16:creationId xmlns:a16="http://schemas.microsoft.com/office/drawing/2014/main" id="{5DAEF314-190F-4E0C-BE8C-EA1BA17A1337}"/>
+              </a:ext>
+            </a:extLst>
+          </p:cNvPr>
+          <p:cNvSpPr/>
+          <p:nvPr/>
+        </p:nvSpPr>
+        <p:spPr>
+          <a:xfrm>
+            <a:off x="4215781" y="1480837"/>
+            <a:ext cx="2202211" cy="447674"/>
+          </a:xfrm>
+          <a:prstGeom prst="rect">
+            <a:avLst/>
+          </a:prstGeom>
+          <a:noFill/>
+          <a:ln w="38100">
+            <a:solidFill>
+              <a:srgbClr val="FF0000"/>
+            </a:solidFill>
+          </a:ln>
+        </p:spPr>
+        <p:style>
+          <a:lnRef idx="2">
+            <a:schemeClr val="accent1">
+              <a:shade val="50000"/>
+            </a:schemeClr>
+          </a:lnRef>
+          <a:fillRef idx="1">
+            <a:schemeClr val="accent1"/>
+          </a:fillRef>
+          <a:effectRef idx="0">
+            <a:schemeClr val="accent1"/>
+          </a:effectRef>
+          <a:fontRef idx="minor">
+            <a:schemeClr val="lt1"/>
+          </a:fontRef>
+        </p:style>
+        <p:txBody>
+          <a:bodyPr rot="0" spcFirstLastPara="0" vert="horz" wrap="square" lIns="91440" tIns="45720" rIns="91440" bIns="45720" numCol="1" spcCol="0" rtlCol="0" fromWordArt="0" anchor="ctr" anchorCtr="0" forceAA="0" compatLnSpc="1">
+            <a:prstTxWarp prst="textNoShape">
+              <a:avLst/>
+            </a:prstTxWarp>
+            <a:noAutofit/>
+          </a:bodyPr>
+          <a:lstStyle/>
+          <a:p>
+            <a:endParaRPr lang="es-ES"/>
+          </a:p>
+        </p:txBody>
+      </p:sp>
+      <p:sp>
+        <p:nvSpPr>
+          <p:cNvPr id="17" name="Text Box 2">
+            <a:extLst>
+              <a:ext uri="{FF2B5EF4-FFF2-40B4-BE49-F238E27FC236}">
+                <a16:creationId xmlns:a16="http://schemas.microsoft.com/office/drawing/2014/main" id="{31EA21A0-DD4F-4747-8342-420B72D09929}"/>
+              </a:ext>
+            </a:extLst>
+          </p:cNvPr>
+          <p:cNvSpPr txBox="1">
+            <a:spLocks noChangeArrowheads="1"/>
+          </p:cNvSpPr>
+          <p:nvPr/>
+        </p:nvSpPr>
+        <p:spPr bwMode="auto">
+          <a:xfrm>
+            <a:off x="6096000" y="1091599"/>
+            <a:ext cx="342900" cy="447675"/>
+          </a:xfrm>
+          <a:prstGeom prst="rect">
+            <a:avLst/>
+          </a:prstGeom>
+          <a:noFill/>
+          <a:ln w="9525">
+            <a:noFill/>
+            <a:miter lim="800000"/>
+            <a:headEnd/>
+            <a:tailEnd/>
+          </a:ln>
+        </p:spPr>
+        <p:txBody>
+          <a:bodyPr rot="0" vert="horz" wrap="square" lIns="91440" tIns="45720" rIns="91440" bIns="45720" anchor="t" anchorCtr="0">
+            <a:noAutofit/>
+          </a:bodyPr>
+          <a:lstStyle/>
+          <a:p>
+            <a:pPr>
+              <a:lnSpc>
+                <a:spcPct val="107000"/>
+              </a:lnSpc>
+              <a:spcAft>
+                <a:spcPts val="800"/>
+              </a:spcAft>
+            </a:pPr>
+            <a:r>
+              <a:rPr lang="en-US" sz="2200" b="1" dirty="0">
+                <a:solidFill>
+                  <a:srgbClr val="FF0000"/>
+                </a:solidFill>
+                <a:latin typeface="Calibri" panose="020F0502020204030204" pitchFamily="34" charset="0"/>
+                <a:ea typeface="Calibri" panose="020F0502020204030204" pitchFamily="34" charset="0"/>
+                <a:cs typeface="Times New Roman" panose="02020603050405020304" pitchFamily="18" charset="0"/>
+              </a:rPr>
+              <a:t>1</a:t>
+            </a:r>
+            <a:endParaRPr lang="es-ES" sz="1100" dirty="0">
+              <a:effectLst/>
+              <a:latin typeface="Calibri" panose="020F0502020204030204" pitchFamily="34" charset="0"/>
+              <a:ea typeface="Calibri" panose="020F0502020204030204" pitchFamily="34" charset="0"/>
+              <a:cs typeface="Times New Roman" panose="02020603050405020304" pitchFamily="18" charset="0"/>
+            </a:endParaRPr>
+          </a:p>
+        </p:txBody>
+      </p:sp>
+      <p:sp>
+        <p:nvSpPr>
+          <p:cNvPr id="19" name="Rectangle 18">
+            <a:extLst>
+              <a:ext uri="{FF2B5EF4-FFF2-40B4-BE49-F238E27FC236}">
+                <a16:creationId xmlns:a16="http://schemas.microsoft.com/office/drawing/2014/main" id="{F2627E10-D44F-45C7-AD6D-9B4933580AEA}"/>
+              </a:ext>
+            </a:extLst>
+          </p:cNvPr>
+          <p:cNvSpPr/>
+          <p:nvPr/>
+        </p:nvSpPr>
+        <p:spPr>
+          <a:xfrm>
+            <a:off x="2679700" y="1585350"/>
+            <a:ext cx="994148" cy="447674"/>
+          </a:xfrm>
+          <a:prstGeom prst="rect">
+            <a:avLst/>
+          </a:prstGeom>
+          <a:noFill/>
+          <a:ln w="38100">
+            <a:solidFill>
+              <a:srgbClr val="FF0000"/>
+            </a:solidFill>
+          </a:ln>
+        </p:spPr>
+        <p:style>
+          <a:lnRef idx="2">
+            <a:schemeClr val="accent1">
+              <a:shade val="50000"/>
+            </a:schemeClr>
+          </a:lnRef>
+          <a:fillRef idx="1">
+            <a:schemeClr val="accent1"/>
+          </a:fillRef>
+          <a:effectRef idx="0">
+            <a:schemeClr val="accent1"/>
+          </a:effectRef>
+          <a:fontRef idx="minor">
+            <a:schemeClr val="lt1"/>
+          </a:fontRef>
+        </p:style>
+        <p:txBody>
+          <a:bodyPr rot="0" spcFirstLastPara="0" vert="horz" wrap="square" lIns="91440" tIns="45720" rIns="91440" bIns="45720" numCol="1" spcCol="0" rtlCol="0" fromWordArt="0" anchor="ctr" anchorCtr="0" forceAA="0" compatLnSpc="1">
+            <a:prstTxWarp prst="textNoShape">
+              <a:avLst/>
+            </a:prstTxWarp>
+            <a:noAutofit/>
+          </a:bodyPr>
+          <a:lstStyle/>
+          <a:p>
+            <a:endParaRPr lang="es-ES"/>
+          </a:p>
+        </p:txBody>
+      </p:sp>
+      <p:sp>
+        <p:nvSpPr>
+          <p:cNvPr id="21" name="Text Box 2">
+            <a:extLst>
+              <a:ext uri="{FF2B5EF4-FFF2-40B4-BE49-F238E27FC236}">
+                <a16:creationId xmlns:a16="http://schemas.microsoft.com/office/drawing/2014/main" id="{94F1EB80-E5FF-4894-AD4C-7747B02CCB6D}"/>
+              </a:ext>
+            </a:extLst>
+          </p:cNvPr>
+          <p:cNvSpPr txBox="1">
+            <a:spLocks noChangeArrowheads="1"/>
+          </p:cNvSpPr>
+          <p:nvPr/>
+        </p:nvSpPr>
+        <p:spPr bwMode="auto">
+          <a:xfrm>
+            <a:off x="3351856" y="1221512"/>
+            <a:ext cx="342900" cy="447675"/>
+          </a:xfrm>
+          <a:prstGeom prst="rect">
+            <a:avLst/>
+          </a:prstGeom>
+          <a:noFill/>
+          <a:ln w="9525">
+            <a:noFill/>
+            <a:miter lim="800000"/>
+            <a:headEnd/>
+            <a:tailEnd/>
+          </a:ln>
+        </p:spPr>
+        <p:txBody>
+          <a:bodyPr rot="0" vert="horz" wrap="square" lIns="91440" tIns="45720" rIns="91440" bIns="45720" anchor="t" anchorCtr="0">
+            <a:noAutofit/>
+          </a:bodyPr>
+          <a:lstStyle/>
+          <a:p>
+            <a:pPr>
+              <a:lnSpc>
+                <a:spcPct val="107000"/>
+              </a:lnSpc>
+              <a:spcAft>
+                <a:spcPts val="800"/>
+              </a:spcAft>
+            </a:pPr>
+            <a:r>
+              <a:rPr lang="en-US" sz="2200" b="1" dirty="0">
+                <a:solidFill>
+                  <a:srgbClr val="FF0000"/>
+                </a:solidFill>
+                <a:latin typeface="Calibri" panose="020F0502020204030204" pitchFamily="34" charset="0"/>
+                <a:ea typeface="Calibri" panose="020F0502020204030204" pitchFamily="34" charset="0"/>
+                <a:cs typeface="Times New Roman" panose="02020603050405020304" pitchFamily="18" charset="0"/>
+              </a:rPr>
+              <a:t>2</a:t>
+            </a:r>
+            <a:endParaRPr lang="es-ES" sz="1100" dirty="0">
+              <a:effectLst/>
+              <a:latin typeface="Calibri" panose="020F0502020204030204" pitchFamily="34" charset="0"/>
+              <a:ea typeface="Calibri" panose="020F0502020204030204" pitchFamily="34" charset="0"/>
+              <a:cs typeface="Times New Roman" panose="02020603050405020304" pitchFamily="18" charset="0"/>
+            </a:endParaRPr>
+          </a:p>
+        </p:txBody>
+      </p:sp>
+      <p:sp>
+        <p:nvSpPr>
+          <p:cNvPr id="22" name="Rectangle 21">
+            <a:extLst>
+              <a:ext uri="{FF2B5EF4-FFF2-40B4-BE49-F238E27FC236}">
+                <a16:creationId xmlns:a16="http://schemas.microsoft.com/office/drawing/2014/main" id="{6F548901-9715-413D-957D-11BBEEA52553}"/>
+              </a:ext>
+            </a:extLst>
+          </p:cNvPr>
+          <p:cNvSpPr/>
+          <p:nvPr/>
+        </p:nvSpPr>
+        <p:spPr>
+          <a:xfrm>
+            <a:off x="1670670" y="2981326"/>
+            <a:ext cx="841454" cy="1146174"/>
+          </a:xfrm>
+          <a:prstGeom prst="rect">
+            <a:avLst/>
+          </a:prstGeom>
+          <a:noFill/>
+          <a:ln w="38100">
+            <a:solidFill>
+              <a:srgbClr val="FF0000"/>
+            </a:solidFill>
+          </a:ln>
+        </p:spPr>
+        <p:style>
+          <a:lnRef idx="2">
+            <a:schemeClr val="accent1">
+              <a:shade val="50000"/>
+            </a:schemeClr>
+          </a:lnRef>
+          <a:fillRef idx="1">
+            <a:schemeClr val="accent1"/>
+          </a:fillRef>
+          <a:effectRef idx="0">
+            <a:schemeClr val="accent1"/>
+          </a:effectRef>
+          <a:fontRef idx="minor">
+            <a:schemeClr val="lt1"/>
+          </a:fontRef>
+        </p:style>
+        <p:txBody>
+          <a:bodyPr rot="0" spcFirstLastPara="0" vert="horz" wrap="square" lIns="91440" tIns="45720" rIns="91440" bIns="45720" numCol="1" spcCol="0" rtlCol="0" fromWordArt="0" anchor="ctr" anchorCtr="0" forceAA="0" compatLnSpc="1">
+            <a:prstTxWarp prst="textNoShape">
+              <a:avLst/>
+            </a:prstTxWarp>
+            <a:noAutofit/>
+          </a:bodyPr>
+          <a:lstStyle/>
+          <a:p>
+            <a:endParaRPr lang="es-ES"/>
+          </a:p>
+        </p:txBody>
+      </p:sp>
+      <p:sp>
+        <p:nvSpPr>
+          <p:cNvPr id="23" name="Text Box 2">
+            <a:extLst>
+              <a:ext uri="{FF2B5EF4-FFF2-40B4-BE49-F238E27FC236}">
+                <a16:creationId xmlns:a16="http://schemas.microsoft.com/office/drawing/2014/main" id="{414DE6E2-DDB3-449A-AFB9-58328BC51083}"/>
+              </a:ext>
+            </a:extLst>
+          </p:cNvPr>
+          <p:cNvSpPr txBox="1">
+            <a:spLocks noChangeArrowheads="1"/>
+          </p:cNvSpPr>
+          <p:nvPr/>
+        </p:nvSpPr>
+        <p:spPr bwMode="auto">
+          <a:xfrm>
+            <a:off x="2055779" y="2540077"/>
+            <a:ext cx="624010" cy="447675"/>
+          </a:xfrm>
+          <a:prstGeom prst="rect">
+            <a:avLst/>
+          </a:prstGeom>
+          <a:noFill/>
+          <a:ln w="9525">
+            <a:noFill/>
+            <a:miter lim="800000"/>
+            <a:headEnd/>
+            <a:tailEnd/>
+          </a:ln>
+        </p:spPr>
+        <p:txBody>
+          <a:bodyPr rot="0" vert="horz" wrap="square" lIns="91440" tIns="45720" rIns="91440" bIns="45720" anchor="t" anchorCtr="0">
+            <a:noAutofit/>
+          </a:bodyPr>
+          <a:lstStyle/>
+          <a:p>
+            <a:pPr>
+              <a:lnSpc>
+                <a:spcPct val="107000"/>
+              </a:lnSpc>
+              <a:spcAft>
+                <a:spcPts val="800"/>
+              </a:spcAft>
+            </a:pPr>
+            <a:r>
+              <a:rPr lang="en-US" sz="2200" b="1" dirty="0">
+                <a:solidFill>
+                  <a:srgbClr val="FF0000"/>
+                </a:solidFill>
+                <a:latin typeface="Calibri" panose="020F0502020204030204" pitchFamily="34" charset="0"/>
+                <a:ea typeface="Calibri" panose="020F0502020204030204" pitchFamily="34" charset="0"/>
+                <a:cs typeface="Times New Roman" panose="02020603050405020304" pitchFamily="18" charset="0"/>
+              </a:rPr>
+              <a:t>2.2</a:t>
+            </a:r>
+            <a:endParaRPr lang="es-ES" sz="1100" dirty="0">
+              <a:effectLst/>
+              <a:latin typeface="Calibri" panose="020F0502020204030204" pitchFamily="34" charset="0"/>
+              <a:ea typeface="Calibri" panose="020F0502020204030204" pitchFamily="34" charset="0"/>
+              <a:cs typeface="Times New Roman" panose="02020603050405020304" pitchFamily="18" charset="0"/>
+            </a:endParaRPr>
+          </a:p>
+        </p:txBody>
+      </p:sp>
+      <p:sp>
+        <p:nvSpPr>
+          <p:cNvPr id="7" name="Rectangle 6">
+            <a:extLst>
+              <a:ext uri="{FF2B5EF4-FFF2-40B4-BE49-F238E27FC236}">
+                <a16:creationId xmlns:a16="http://schemas.microsoft.com/office/drawing/2014/main" id="{1B82D6D4-ACA5-4323-B654-AED6B9A52456}"/>
+              </a:ext>
+            </a:extLst>
+          </p:cNvPr>
+          <p:cNvSpPr/>
+          <p:nvPr/>
+        </p:nvSpPr>
+        <p:spPr>
+          <a:xfrm>
+            <a:off x="585454" y="4308297"/>
+            <a:ext cx="2923565" cy="707886"/>
+          </a:xfrm>
+          <a:prstGeom prst="rect">
+            <a:avLst/>
+          </a:prstGeom>
+          <a:noFill/>
+        </p:spPr>
+        <p:txBody>
+          <a:bodyPr wrap="square" lIns="91440" tIns="45720" rIns="91440" bIns="45720">
+            <a:spAutoFit/>
+          </a:bodyPr>
+          <a:lstStyle/>
+          <a:p>
+            <a:pPr algn="ctr"/>
+            <a:r>
+              <a:rPr lang="en-US" sz="2000" b="1" dirty="0">
+                <a:ln w="12700" cmpd="sng">
+                  <a:solidFill>
+                    <a:schemeClr val="accent4"/>
+                  </a:solidFill>
+                  <a:prstDash val="solid"/>
+                </a:ln>
+                <a:gradFill>
+                  <a:gsLst>
+                    <a:gs pos="0">
+                      <a:schemeClr val="accent4"/>
+                    </a:gs>
+                    <a:gs pos="4000">
+                      <a:schemeClr val="accent4">
+                        <a:lumMod val="60000"/>
+                        <a:lumOff val="40000"/>
+                      </a:schemeClr>
+                    </a:gs>
+                    <a:gs pos="87000">
+                      <a:schemeClr val="accent4">
+                        <a:lumMod val="20000"/>
+                        <a:lumOff val="80000"/>
+                      </a:schemeClr>
+                    </a:gs>
+                  </a:gsLst>
+                  <a:lin ang="5400000"/>
+                </a:gradFill>
+              </a:rPr>
+              <a:t>“Keep it green”</a:t>
+            </a:r>
+            <a:br>
+              <a:rPr lang="en-US" sz="2000" b="1" dirty="0">
+                <a:ln w="12700" cmpd="sng">
+                  <a:solidFill>
+                    <a:schemeClr val="accent4"/>
+                  </a:solidFill>
+                  <a:prstDash val="solid"/>
+                </a:ln>
+                <a:gradFill>
+                  <a:gsLst>
+                    <a:gs pos="0">
+                      <a:schemeClr val="accent4"/>
+                    </a:gs>
+                    <a:gs pos="4000">
+                      <a:schemeClr val="accent4">
+                        <a:lumMod val="60000"/>
+                        <a:lumOff val="40000"/>
+                      </a:schemeClr>
+                    </a:gs>
+                    <a:gs pos="87000">
+                      <a:schemeClr val="accent4">
+                        <a:lumMod val="20000"/>
+                        <a:lumOff val="80000"/>
+                      </a:schemeClr>
+                    </a:gs>
+                  </a:gsLst>
+                  <a:lin ang="5400000"/>
+                </a:gradFill>
+              </a:rPr>
+            </a:br>
+            <a:r>
+              <a:rPr lang="en-US" sz="2000" b="1" dirty="0">
+                <a:ln w="12700" cmpd="sng">
+                  <a:solidFill>
+                    <a:schemeClr val="accent4"/>
+                  </a:solidFill>
+                  <a:prstDash val="solid"/>
+                </a:ln>
+                <a:gradFill>
+                  <a:gsLst>
+                    <a:gs pos="0">
+                      <a:schemeClr val="accent4"/>
+                    </a:gs>
+                    <a:gs pos="4000">
+                      <a:schemeClr val="accent4">
+                        <a:lumMod val="60000"/>
+                        <a:lumOff val="40000"/>
+                      </a:schemeClr>
+                    </a:gs>
+                    <a:gs pos="87000">
+                      <a:schemeClr val="accent4">
+                        <a:lumMod val="20000"/>
+                        <a:lumOff val="80000"/>
+                      </a:schemeClr>
+                    </a:gs>
+                  </a:gsLst>
+                  <a:lin ang="5400000"/>
+                </a:gradFill>
+              </a:rPr>
+              <a:t>zone</a:t>
+            </a:r>
+            <a:endParaRPr lang="en-US" sz="2000" b="1" cap="none" spc="0" dirty="0">
+              <a:ln w="12700" cmpd="sng">
+                <a:solidFill>
+                  <a:schemeClr val="accent4"/>
+                </a:solidFill>
+                <a:prstDash val="solid"/>
+              </a:ln>
+              <a:gradFill>
+                <a:gsLst>
+                  <a:gs pos="0">
+                    <a:schemeClr val="accent4"/>
+                  </a:gs>
+                  <a:gs pos="4000">
+                    <a:schemeClr val="accent4">
+                      <a:lumMod val="60000"/>
+                      <a:lumOff val="40000"/>
+                    </a:schemeClr>
+                  </a:gs>
+                  <a:gs pos="87000">
+                    <a:schemeClr val="accent4">
+                      <a:lumMod val="20000"/>
+                      <a:lumOff val="80000"/>
+                    </a:schemeClr>
+                  </a:gs>
+                </a:gsLst>
+                <a:lin ang="5400000"/>
+              </a:gradFill>
+              <a:effectLst/>
+            </a:endParaRPr>
+          </a:p>
+        </p:txBody>
+      </p:sp>
+      <p:sp>
+        <p:nvSpPr>
+          <p:cNvPr id="24" name="Rectangle 23">
+            <a:extLst>
+              <a:ext uri="{FF2B5EF4-FFF2-40B4-BE49-F238E27FC236}">
+                <a16:creationId xmlns:a16="http://schemas.microsoft.com/office/drawing/2014/main" id="{B6848798-D87C-4DDA-BA79-AABC9D4E73EF}"/>
+              </a:ext>
+            </a:extLst>
+          </p:cNvPr>
+          <p:cNvSpPr/>
+          <p:nvPr/>
+        </p:nvSpPr>
+        <p:spPr>
+          <a:xfrm>
+            <a:off x="5675273" y="5016183"/>
+            <a:ext cx="841454" cy="1323305"/>
+          </a:xfrm>
+          <a:prstGeom prst="rect">
+            <a:avLst/>
+          </a:prstGeom>
+          <a:noFill/>
+          <a:ln w="38100">
+            <a:solidFill>
+              <a:srgbClr val="FF0000"/>
+            </a:solidFill>
+          </a:ln>
+        </p:spPr>
+        <p:style>
+          <a:lnRef idx="2">
+            <a:schemeClr val="accent1">
+              <a:shade val="50000"/>
+            </a:schemeClr>
+          </a:lnRef>
+          <a:fillRef idx="1">
+            <a:schemeClr val="accent1"/>
+          </a:fillRef>
+          <a:effectRef idx="0">
+            <a:schemeClr val="accent1"/>
+          </a:effectRef>
+          <a:fontRef idx="minor">
+            <a:schemeClr val="lt1"/>
+          </a:fontRef>
+        </p:style>
+        <p:txBody>
+          <a:bodyPr rot="0" spcFirstLastPara="0" vert="horz" wrap="square" lIns="91440" tIns="45720" rIns="91440" bIns="45720" numCol="1" spcCol="0" rtlCol="0" fromWordArt="0" anchor="ctr" anchorCtr="0" forceAA="0" compatLnSpc="1">
+            <a:prstTxWarp prst="textNoShape">
+              <a:avLst/>
+            </a:prstTxWarp>
+            <a:noAutofit/>
+          </a:bodyPr>
+          <a:lstStyle/>
+          <a:p>
+            <a:endParaRPr lang="es-ES"/>
+          </a:p>
+        </p:txBody>
+      </p:sp>
+      <p:sp>
+        <p:nvSpPr>
+          <p:cNvPr id="29" name="Text Box 2">
+            <a:extLst>
+              <a:ext uri="{FF2B5EF4-FFF2-40B4-BE49-F238E27FC236}">
+                <a16:creationId xmlns:a16="http://schemas.microsoft.com/office/drawing/2014/main" id="{22C8D1B3-73A6-42B2-938B-329132EB8B7E}"/>
+              </a:ext>
+            </a:extLst>
+          </p:cNvPr>
+          <p:cNvSpPr txBox="1">
+            <a:spLocks noChangeArrowheads="1"/>
+          </p:cNvSpPr>
+          <p:nvPr/>
+        </p:nvSpPr>
+        <p:spPr bwMode="auto">
+          <a:xfrm>
+            <a:off x="6237098" y="4574934"/>
+            <a:ext cx="624010" cy="447675"/>
+          </a:xfrm>
+          <a:prstGeom prst="rect">
+            <a:avLst/>
+          </a:prstGeom>
+          <a:noFill/>
+          <a:ln w="9525">
+            <a:noFill/>
+            <a:miter lim="800000"/>
+            <a:headEnd/>
+            <a:tailEnd/>
+          </a:ln>
+        </p:spPr>
+        <p:txBody>
+          <a:bodyPr rot="0" vert="horz" wrap="square" lIns="91440" tIns="45720" rIns="91440" bIns="45720" anchor="t" anchorCtr="0">
+            <a:noAutofit/>
+          </a:bodyPr>
+          <a:lstStyle/>
+          <a:p>
+            <a:pPr>
+              <a:lnSpc>
+                <a:spcPct val="107000"/>
+              </a:lnSpc>
+              <a:spcAft>
+                <a:spcPts val="800"/>
+              </a:spcAft>
+            </a:pPr>
+            <a:r>
+              <a:rPr lang="en-US" sz="2200" b="1" dirty="0">
+                <a:solidFill>
+                  <a:srgbClr val="FF0000"/>
+                </a:solidFill>
+                <a:latin typeface="Calibri" panose="020F0502020204030204" pitchFamily="34" charset="0"/>
+                <a:ea typeface="Calibri" panose="020F0502020204030204" pitchFamily="34" charset="0"/>
+                <a:cs typeface="Times New Roman" panose="02020603050405020304" pitchFamily="18" charset="0"/>
+              </a:rPr>
+              <a:t>3</a:t>
+            </a:r>
+            <a:endParaRPr lang="es-ES" sz="1100" dirty="0">
+              <a:effectLst/>
+              <a:latin typeface="Calibri" panose="020F0502020204030204" pitchFamily="34" charset="0"/>
+              <a:ea typeface="Calibri" panose="020F0502020204030204" pitchFamily="34" charset="0"/>
+              <a:cs typeface="Times New Roman" panose="02020603050405020304" pitchFamily="18" charset="0"/>
+            </a:endParaRPr>
+          </a:p>
+        </p:txBody>
+      </p:sp>
+      <p:sp>
+        <p:nvSpPr>
+          <p:cNvPr id="30" name="Rectangle 29">
+            <a:extLst>
+              <a:ext uri="{FF2B5EF4-FFF2-40B4-BE49-F238E27FC236}">
+                <a16:creationId xmlns:a16="http://schemas.microsoft.com/office/drawing/2014/main" id="{999949AD-A851-4650-940C-ECE4082915C6}"/>
+              </a:ext>
+            </a:extLst>
+          </p:cNvPr>
+          <p:cNvSpPr/>
+          <p:nvPr/>
+        </p:nvSpPr>
+        <p:spPr>
+          <a:xfrm>
+            <a:off x="800572" y="5016183"/>
+            <a:ext cx="841454" cy="1323305"/>
+          </a:xfrm>
+          <a:prstGeom prst="rect">
+            <a:avLst/>
+          </a:prstGeom>
+          <a:noFill/>
+          <a:ln w="38100">
+            <a:solidFill>
+              <a:srgbClr val="FF0000"/>
+            </a:solidFill>
+          </a:ln>
+        </p:spPr>
+        <p:style>
+          <a:lnRef idx="2">
+            <a:schemeClr val="accent1">
+              <a:shade val="50000"/>
+            </a:schemeClr>
+          </a:lnRef>
+          <a:fillRef idx="1">
+            <a:schemeClr val="accent1"/>
+          </a:fillRef>
+          <a:effectRef idx="0">
+            <a:schemeClr val="accent1"/>
+          </a:effectRef>
+          <a:fontRef idx="minor">
+            <a:schemeClr val="lt1"/>
+          </a:fontRef>
+        </p:style>
+        <p:txBody>
+          <a:bodyPr rot="0" spcFirstLastPara="0" vert="horz" wrap="square" lIns="91440" tIns="45720" rIns="91440" bIns="45720" numCol="1" spcCol="0" rtlCol="0" fromWordArt="0" anchor="ctr" anchorCtr="0" forceAA="0" compatLnSpc="1">
+            <a:prstTxWarp prst="textNoShape">
+              <a:avLst/>
+            </a:prstTxWarp>
+            <a:noAutofit/>
+          </a:bodyPr>
+          <a:lstStyle/>
+          <a:p>
+            <a:endParaRPr lang="es-ES"/>
+          </a:p>
+        </p:txBody>
+      </p:sp>
+      <p:sp>
+        <p:nvSpPr>
+          <p:cNvPr id="31" name="Text Box 2">
+            <a:extLst>
+              <a:ext uri="{FF2B5EF4-FFF2-40B4-BE49-F238E27FC236}">
+                <a16:creationId xmlns:a16="http://schemas.microsoft.com/office/drawing/2014/main" id="{EC0199DB-DCDE-4D5C-98D6-AA972DEC25F4}"/>
+              </a:ext>
+            </a:extLst>
+          </p:cNvPr>
+          <p:cNvSpPr txBox="1">
+            <a:spLocks noChangeArrowheads="1"/>
+          </p:cNvSpPr>
+          <p:nvPr/>
+        </p:nvSpPr>
+        <p:spPr bwMode="auto">
+          <a:xfrm>
+            <a:off x="1362397" y="4574934"/>
+            <a:ext cx="624010" cy="447675"/>
+          </a:xfrm>
+          <a:prstGeom prst="rect">
+            <a:avLst/>
+          </a:prstGeom>
+          <a:noFill/>
+          <a:ln w="9525">
+            <a:noFill/>
+            <a:miter lim="800000"/>
+            <a:headEnd/>
+            <a:tailEnd/>
+          </a:ln>
+        </p:spPr>
+        <p:txBody>
+          <a:bodyPr rot="0" vert="horz" wrap="square" lIns="91440" tIns="45720" rIns="91440" bIns="45720" anchor="t" anchorCtr="0">
+            <a:noAutofit/>
+          </a:bodyPr>
+          <a:lstStyle/>
+          <a:p>
+            <a:pPr>
+              <a:lnSpc>
+                <a:spcPct val="107000"/>
+              </a:lnSpc>
+              <a:spcAft>
+                <a:spcPts val="800"/>
+              </a:spcAft>
+            </a:pPr>
+            <a:r>
+              <a:rPr lang="en-US" sz="2200" b="1" dirty="0">
+                <a:solidFill>
+                  <a:srgbClr val="FF0000"/>
+                </a:solidFill>
+                <a:effectLst/>
+                <a:latin typeface="Calibri" panose="020F0502020204030204" pitchFamily="34" charset="0"/>
+                <a:ea typeface="Calibri" panose="020F0502020204030204" pitchFamily="34" charset="0"/>
+                <a:cs typeface="Times New Roman" panose="02020603050405020304" pitchFamily="18" charset="0"/>
+              </a:rPr>
+              <a:t>6</a:t>
+            </a:r>
+            <a:endParaRPr lang="es-ES" sz="1100" dirty="0">
+              <a:effectLst/>
+              <a:latin typeface="Calibri" panose="020F0502020204030204" pitchFamily="34" charset="0"/>
+              <a:ea typeface="Calibri" panose="020F0502020204030204" pitchFamily="34" charset="0"/>
+              <a:cs typeface="Times New Roman" panose="02020603050405020304" pitchFamily="18" charset="0"/>
+            </a:endParaRPr>
+          </a:p>
+        </p:txBody>
+      </p:sp>
+      <p:sp>
+        <p:nvSpPr>
+          <p:cNvPr id="32" name="Rectangle 31">
+            <a:extLst>
+              <a:ext uri="{FF2B5EF4-FFF2-40B4-BE49-F238E27FC236}">
+                <a16:creationId xmlns:a16="http://schemas.microsoft.com/office/drawing/2014/main" id="{59280D28-35E1-4E92-94F4-ED4139EEEA4E}"/>
+              </a:ext>
+            </a:extLst>
+          </p:cNvPr>
+          <p:cNvSpPr/>
+          <p:nvPr/>
+        </p:nvSpPr>
+        <p:spPr>
+          <a:xfrm>
+            <a:off x="1739689" y="1547212"/>
+            <a:ext cx="841455" cy="485812"/>
+          </a:xfrm>
+          <a:prstGeom prst="rect">
+            <a:avLst/>
+          </a:prstGeom>
+          <a:noFill/>
+          <a:ln w="38100">
+            <a:solidFill>
+              <a:srgbClr val="FF0000"/>
+            </a:solidFill>
+          </a:ln>
+        </p:spPr>
+        <p:style>
+          <a:lnRef idx="2">
+            <a:schemeClr val="accent1">
+              <a:shade val="50000"/>
+            </a:schemeClr>
+          </a:lnRef>
+          <a:fillRef idx="1">
+            <a:schemeClr val="accent1"/>
+          </a:fillRef>
+          <a:effectRef idx="0">
+            <a:schemeClr val="accent1"/>
+          </a:effectRef>
+          <a:fontRef idx="minor">
+            <a:schemeClr val="lt1"/>
+          </a:fontRef>
+        </p:style>
+        <p:txBody>
+          <a:bodyPr rot="0" spcFirstLastPara="0" vert="horz" wrap="square" lIns="91440" tIns="45720" rIns="91440" bIns="45720" numCol="1" spcCol="0" rtlCol="0" fromWordArt="0" anchor="ctr" anchorCtr="0" forceAA="0" compatLnSpc="1">
+            <a:prstTxWarp prst="textNoShape">
+              <a:avLst/>
+            </a:prstTxWarp>
+            <a:noAutofit/>
+          </a:bodyPr>
+          <a:lstStyle/>
+          <a:p>
+            <a:endParaRPr lang="es-ES"/>
+          </a:p>
+        </p:txBody>
+      </p:sp>
+      <p:sp>
+        <p:nvSpPr>
+          <p:cNvPr id="35" name="Rectangle 34">
+            <a:extLst>
+              <a:ext uri="{FF2B5EF4-FFF2-40B4-BE49-F238E27FC236}">
+                <a16:creationId xmlns:a16="http://schemas.microsoft.com/office/drawing/2014/main" id="{0123F6E3-C666-42FA-B00F-D5E699804A30}"/>
+              </a:ext>
+            </a:extLst>
+          </p:cNvPr>
+          <p:cNvSpPr/>
+          <p:nvPr/>
+        </p:nvSpPr>
+        <p:spPr>
+          <a:xfrm>
+            <a:off x="825270" y="1537029"/>
+            <a:ext cx="841455" cy="485812"/>
+          </a:xfrm>
+          <a:prstGeom prst="rect">
+            <a:avLst/>
+          </a:prstGeom>
+          <a:noFill/>
+          <a:ln w="38100">
+            <a:solidFill>
+              <a:srgbClr val="FF0000"/>
+            </a:solidFill>
+          </a:ln>
+        </p:spPr>
+        <p:style>
+          <a:lnRef idx="2">
+            <a:schemeClr val="accent1">
+              <a:shade val="50000"/>
+            </a:schemeClr>
+          </a:lnRef>
+          <a:fillRef idx="1">
+            <a:schemeClr val="accent1"/>
+          </a:fillRef>
+          <a:effectRef idx="0">
+            <a:schemeClr val="accent1"/>
+          </a:effectRef>
+          <a:fontRef idx="minor">
+            <a:schemeClr val="lt1"/>
+          </a:fontRef>
+        </p:style>
+        <p:txBody>
+          <a:bodyPr rot="0" spcFirstLastPara="0" vert="horz" wrap="square" lIns="91440" tIns="45720" rIns="91440" bIns="45720" numCol="1" spcCol="0" rtlCol="0" fromWordArt="0" anchor="ctr" anchorCtr="0" forceAA="0" compatLnSpc="1">
+            <a:prstTxWarp prst="textNoShape">
+              <a:avLst/>
+            </a:prstTxWarp>
+            <a:noAutofit/>
+          </a:bodyPr>
+          <a:lstStyle/>
+          <a:p>
+            <a:endParaRPr lang="es-ES"/>
+          </a:p>
+        </p:txBody>
+      </p:sp>
+      <p:sp>
+        <p:nvSpPr>
+          <p:cNvPr id="36" name="Text Box 2">
+            <a:extLst>
+              <a:ext uri="{FF2B5EF4-FFF2-40B4-BE49-F238E27FC236}">
+                <a16:creationId xmlns:a16="http://schemas.microsoft.com/office/drawing/2014/main" id="{7F82CF72-EDEA-4E74-9A9C-0664722A3687}"/>
+              </a:ext>
+            </a:extLst>
+          </p:cNvPr>
+          <p:cNvSpPr txBox="1">
+            <a:spLocks noChangeArrowheads="1"/>
+          </p:cNvSpPr>
+          <p:nvPr/>
+        </p:nvSpPr>
+        <p:spPr bwMode="auto">
+          <a:xfrm>
+            <a:off x="2261125" y="1184330"/>
+            <a:ext cx="342900" cy="447675"/>
+          </a:xfrm>
+          <a:prstGeom prst="rect">
+            <a:avLst/>
+          </a:prstGeom>
+          <a:noFill/>
+          <a:ln w="9525">
+            <a:noFill/>
+            <a:miter lim="800000"/>
+            <a:headEnd/>
+            <a:tailEnd/>
+          </a:ln>
+        </p:spPr>
+        <p:txBody>
+          <a:bodyPr rot="0" vert="horz" wrap="square" lIns="91440" tIns="45720" rIns="91440" bIns="45720" anchor="t" anchorCtr="0">
+            <a:noAutofit/>
+          </a:bodyPr>
+          <a:lstStyle/>
+          <a:p>
+            <a:pPr>
+              <a:lnSpc>
+                <a:spcPct val="107000"/>
+              </a:lnSpc>
+              <a:spcAft>
+                <a:spcPts val="800"/>
+              </a:spcAft>
+            </a:pPr>
+            <a:r>
+              <a:rPr lang="en-US" sz="2200" b="1" dirty="0">
+                <a:solidFill>
+                  <a:srgbClr val="FF0000"/>
+                </a:solidFill>
+                <a:effectLst/>
+                <a:latin typeface="Calibri" panose="020F0502020204030204" pitchFamily="34" charset="0"/>
+                <a:ea typeface="Calibri" panose="020F0502020204030204" pitchFamily="34" charset="0"/>
+                <a:cs typeface="Times New Roman" panose="02020603050405020304" pitchFamily="18" charset="0"/>
+              </a:rPr>
+              <a:t>4</a:t>
+            </a:r>
+            <a:endParaRPr lang="es-ES" sz="1100" dirty="0">
+              <a:effectLst/>
+              <a:latin typeface="Calibri" panose="020F0502020204030204" pitchFamily="34" charset="0"/>
+              <a:ea typeface="Calibri" panose="020F0502020204030204" pitchFamily="34" charset="0"/>
+              <a:cs typeface="Times New Roman" panose="02020603050405020304" pitchFamily="18" charset="0"/>
+            </a:endParaRPr>
+          </a:p>
+        </p:txBody>
+      </p:sp>
+      <p:sp>
+        <p:nvSpPr>
+          <p:cNvPr id="37" name="Text Box 2">
+            <a:extLst>
+              <a:ext uri="{FF2B5EF4-FFF2-40B4-BE49-F238E27FC236}">
+                <a16:creationId xmlns:a16="http://schemas.microsoft.com/office/drawing/2014/main" id="{008CA8E8-A433-4799-85EA-F5633F664A98}"/>
+              </a:ext>
+            </a:extLst>
+          </p:cNvPr>
+          <p:cNvSpPr txBox="1">
+            <a:spLocks noChangeArrowheads="1"/>
+          </p:cNvSpPr>
+          <p:nvPr/>
+        </p:nvSpPr>
+        <p:spPr bwMode="auto">
+          <a:xfrm>
+            <a:off x="1385034" y="1176119"/>
+            <a:ext cx="342900" cy="447675"/>
+          </a:xfrm>
+          <a:prstGeom prst="rect">
+            <a:avLst/>
+          </a:prstGeom>
+          <a:noFill/>
+          <a:ln w="9525">
+            <a:noFill/>
+            <a:miter lim="800000"/>
+            <a:headEnd/>
+            <a:tailEnd/>
+          </a:ln>
+        </p:spPr>
+        <p:txBody>
+          <a:bodyPr rot="0" vert="horz" wrap="square" lIns="91440" tIns="45720" rIns="91440" bIns="45720" anchor="t" anchorCtr="0">
+            <a:noAutofit/>
+          </a:bodyPr>
+          <a:lstStyle/>
+          <a:p>
+            <a:pPr>
+              <a:lnSpc>
+                <a:spcPct val="107000"/>
+              </a:lnSpc>
+              <a:spcAft>
+                <a:spcPts val="800"/>
+              </a:spcAft>
+            </a:pPr>
+            <a:r>
+              <a:rPr lang="en-US" sz="2200" b="1" dirty="0">
+                <a:solidFill>
+                  <a:srgbClr val="FF0000"/>
+                </a:solidFill>
+                <a:latin typeface="Calibri" panose="020F0502020204030204" pitchFamily="34" charset="0"/>
+                <a:ea typeface="Calibri" panose="020F0502020204030204" pitchFamily="34" charset="0"/>
+                <a:cs typeface="Times New Roman" panose="02020603050405020304" pitchFamily="18" charset="0"/>
+              </a:rPr>
+              <a:t>5</a:t>
+            </a:r>
+            <a:endParaRPr lang="es-ES" sz="1100" dirty="0">
+              <a:effectLst/>
+              <a:latin typeface="Calibri" panose="020F0502020204030204" pitchFamily="34" charset="0"/>
+              <a:ea typeface="Calibri" panose="020F0502020204030204" pitchFamily="34" charset="0"/>
+              <a:cs typeface="Times New Roman" panose="02020603050405020304" pitchFamily="18" charset="0"/>
+            </a:endParaRPr>
+          </a:p>
+        </p:txBody>
+      </p:sp>
+    </p:spTree>
+    <p:extLst>
+      <p:ext uri="{BB962C8B-B14F-4D97-AF65-F5344CB8AC3E}">
+        <p14:creationId xmlns:p14="http://schemas.microsoft.com/office/powerpoint/2010/main" val="565209216"/>
+      </p:ext>
+    </p:extLst>
+  </p:cSld>
+  <p:clrMapOvr>
+    <a:masterClrMapping/>
+  </p:clrMapOvr>
+</p:sld>
+</file>
+
 <file path=ppt/slides/slide2.xml><?xml version="1.0" encoding="utf-8"?>
 <p:sld xmlns:a="http://schemas.openxmlformats.org/drawingml/2006/main" xmlns:r="http://schemas.openxmlformats.org/officeDocument/2006/relationships" xmlns:p="http://schemas.openxmlformats.org/presentationml/2006/main">
   <p:cSld>

</xml_diff>